<commit_message>
corrected spelling, added timetable
</commit_message>
<xml_diff>
--- a/Vortrag1.pptx
+++ b/Vortrag1.pptx
@@ -15,6 +15,7 @@
     <p:sldId id="263" r:id="rId9"/>
     <p:sldId id="264" r:id="rId10"/>
     <p:sldId id="265" r:id="rId11"/>
+    <p:sldId id="266" r:id="rId12"/>
   </p:sldIdLst>
   <p:sldSz cx="12192000" cy="6858000"/>
   <p:notesSz cx="6858000" cy="9144000"/>
@@ -115,7 +116,7 @@
   </p:defaultTextStyle>
   <p:extLst>
     <p:ext uri="{EFAFB233-063F-42B5-8137-9DF3F51BA10A}">
-      <p15:sldGuideLst xmlns:p15="http://schemas.microsoft.com/office/powerpoint/2012/main"/>
+      <p15:sldGuideLst xmlns:p15="http://schemas.microsoft.com/office/powerpoint/2012/main" xmlns=""/>
     </p:ext>
   </p:extLst>
 </p:presentation>
@@ -124,11 +125,7 @@
 <file path=ppt/commentAuthors.xml><?xml version="1.0" encoding="utf-8"?>
 <p:cmAuthorLst xmlns:a="http://schemas.openxmlformats.org/drawingml/2006/main" xmlns:r="http://schemas.openxmlformats.org/officeDocument/2006/relationships" xmlns:p="http://schemas.openxmlformats.org/presentationml/2006/main">
   <p:cmAuthor id="1" name="Lukas Voos" initials="LV" lastIdx="1" clrIdx="0">
-    <p:extLst>
-      <p:ext uri="{19B8F6BF-5375-455C-9EA6-DF929625EA0E}">
-        <p15:presenceInfo xmlns:p15="http://schemas.microsoft.com/office/powerpoint/2012/main" userId="f3e8d84b45cd40f9" providerId="Windows Live"/>
-      </p:ext>
-    </p:extLst>
+    <p:extLst/>
   </p:cmAuthor>
 </p:cmAuthorLst>
 </file>
@@ -289,7 +286,7 @@
           <a:p>
             <a:fld id="{DADE5541-CCBC-45F8-BFC8-A72604CF239D}" type="datetimeFigureOut">
               <a:rPr lang="de-DE" smtClean="0"/>
-              <a:t>13.05.2019</a:t>
+              <a:t>14.05.2019</a:t>
             </a:fld>
             <a:endParaRPr lang="de-DE"/>
           </a:p>
@@ -331,7 +328,7 @@
           <a:p>
             <a:fld id="{29E7901B-09AF-4D4A-907F-86E00F8E0E92}" type="slidenum">
               <a:rPr lang="de-DE" smtClean="0"/>
-              <a:t>‹Nr.›</a:t>
+              <a:t>‹#›</a:t>
             </a:fld>
             <a:endParaRPr lang="de-DE"/>
           </a:p>
@@ -459,7 +456,7 @@
           <a:p>
             <a:fld id="{DADE5541-CCBC-45F8-BFC8-A72604CF239D}" type="datetimeFigureOut">
               <a:rPr lang="de-DE" smtClean="0"/>
-              <a:t>13.05.2019</a:t>
+              <a:t>14.05.2019</a:t>
             </a:fld>
             <a:endParaRPr lang="de-DE"/>
           </a:p>
@@ -501,7 +498,7 @@
           <a:p>
             <a:fld id="{29E7901B-09AF-4D4A-907F-86E00F8E0E92}" type="slidenum">
               <a:rPr lang="de-DE" smtClean="0"/>
-              <a:t>‹Nr.›</a:t>
+              <a:t>‹#›</a:t>
             </a:fld>
             <a:endParaRPr lang="de-DE"/>
           </a:p>
@@ -639,7 +636,7 @@
           <a:p>
             <a:fld id="{DADE5541-CCBC-45F8-BFC8-A72604CF239D}" type="datetimeFigureOut">
               <a:rPr lang="de-DE" smtClean="0"/>
-              <a:t>13.05.2019</a:t>
+              <a:t>14.05.2019</a:t>
             </a:fld>
             <a:endParaRPr lang="de-DE"/>
           </a:p>
@@ -681,7 +678,7 @@
           <a:p>
             <a:fld id="{29E7901B-09AF-4D4A-907F-86E00F8E0E92}" type="slidenum">
               <a:rPr lang="de-DE" smtClean="0"/>
-              <a:t>‹Nr.›</a:t>
+              <a:t>‹#›</a:t>
             </a:fld>
             <a:endParaRPr lang="de-DE"/>
           </a:p>
@@ -842,7 +839,7 @@
           <a:p>
             <a:fld id="{DADE5541-CCBC-45F8-BFC8-A72604CF239D}" type="datetimeFigureOut">
               <a:rPr lang="de-DE" smtClean="0"/>
-              <a:t>13.05.2019</a:t>
+              <a:t>14.05.2019</a:t>
             </a:fld>
             <a:endParaRPr lang="de-DE"/>
           </a:p>
@@ -884,7 +881,7 @@
           <a:p>
             <a:fld id="{29E7901B-09AF-4D4A-907F-86E00F8E0E92}" type="slidenum">
               <a:rPr lang="de-DE" smtClean="0"/>
-              <a:t>‹Nr.›</a:t>
+              <a:t>‹#›</a:t>
             </a:fld>
             <a:endParaRPr lang="de-DE"/>
           </a:p>
@@ -1012,7 +1009,7 @@
           <a:p>
             <a:fld id="{DADE5541-CCBC-45F8-BFC8-A72604CF239D}" type="datetimeFigureOut">
               <a:rPr lang="de-DE" smtClean="0"/>
-              <a:t>13.05.2019</a:t>
+              <a:t>14.05.2019</a:t>
             </a:fld>
             <a:endParaRPr lang="de-DE"/>
           </a:p>
@@ -1054,7 +1051,7 @@
           <a:p>
             <a:fld id="{29E7901B-09AF-4D4A-907F-86E00F8E0E92}" type="slidenum">
               <a:rPr lang="de-DE" smtClean="0"/>
-              <a:t>‹Nr.›</a:t>
+              <a:t>‹#›</a:t>
             </a:fld>
             <a:endParaRPr lang="de-DE"/>
           </a:p>
@@ -1263,7 +1260,7 @@
           <a:p>
             <a:fld id="{DADE5541-CCBC-45F8-BFC8-A72604CF239D}" type="datetimeFigureOut">
               <a:rPr lang="de-DE" smtClean="0"/>
-              <a:t>13.05.2019</a:t>
+              <a:t>14.05.2019</a:t>
             </a:fld>
             <a:endParaRPr lang="de-DE"/>
           </a:p>
@@ -1305,7 +1302,7 @@
           <a:p>
             <a:fld id="{29E7901B-09AF-4D4A-907F-86E00F8E0E92}" type="slidenum">
               <a:rPr lang="de-DE" smtClean="0"/>
-              <a:t>‹Nr.›</a:t>
+              <a:t>‹#›</a:t>
             </a:fld>
             <a:endParaRPr lang="de-DE"/>
           </a:p>
@@ -1495,7 +1492,7 @@
           <a:p>
             <a:fld id="{DADE5541-CCBC-45F8-BFC8-A72604CF239D}" type="datetimeFigureOut">
               <a:rPr lang="de-DE" smtClean="0"/>
-              <a:t>13.05.2019</a:t>
+              <a:t>14.05.2019</a:t>
             </a:fld>
             <a:endParaRPr lang="de-DE"/>
           </a:p>
@@ -1537,7 +1534,7 @@
           <a:p>
             <a:fld id="{29E7901B-09AF-4D4A-907F-86E00F8E0E92}" type="slidenum">
               <a:rPr lang="de-DE" smtClean="0"/>
-              <a:t>‹Nr.›</a:t>
+              <a:t>‹#›</a:t>
             </a:fld>
             <a:endParaRPr lang="de-DE"/>
           </a:p>
@@ -1842,7 +1839,7 @@
           <a:p>
             <a:fld id="{DADE5541-CCBC-45F8-BFC8-A72604CF239D}" type="datetimeFigureOut">
               <a:rPr lang="de-DE" smtClean="0"/>
-              <a:t>13.05.2019</a:t>
+              <a:t>14.05.2019</a:t>
             </a:fld>
             <a:endParaRPr lang="de-DE"/>
           </a:p>
@@ -1884,7 +1881,7 @@
           <a:p>
             <a:fld id="{29E7901B-09AF-4D4A-907F-86E00F8E0E92}" type="slidenum">
               <a:rPr lang="de-DE" smtClean="0"/>
-              <a:t>‹Nr.›</a:t>
+              <a:t>‹#›</a:t>
             </a:fld>
             <a:endParaRPr lang="de-DE"/>
           </a:p>
@@ -1960,7 +1957,7 @@
           <a:p>
             <a:fld id="{DADE5541-CCBC-45F8-BFC8-A72604CF239D}" type="datetimeFigureOut">
               <a:rPr lang="de-DE" smtClean="0"/>
-              <a:t>13.05.2019</a:t>
+              <a:t>14.05.2019</a:t>
             </a:fld>
             <a:endParaRPr lang="de-DE"/>
           </a:p>
@@ -2002,7 +1999,7 @@
           <a:p>
             <a:fld id="{29E7901B-09AF-4D4A-907F-86E00F8E0E92}" type="slidenum">
               <a:rPr lang="de-DE" smtClean="0"/>
-              <a:t>‹Nr.›</a:t>
+              <a:t>‹#›</a:t>
             </a:fld>
             <a:endParaRPr lang="de-DE"/>
           </a:p>
@@ -2078,7 +2075,7 @@
           <a:p>
             <a:fld id="{DADE5541-CCBC-45F8-BFC8-A72604CF239D}" type="datetimeFigureOut">
               <a:rPr lang="de-DE" smtClean="0"/>
-              <a:t>13.05.2019</a:t>
+              <a:t>14.05.2019</a:t>
             </a:fld>
             <a:endParaRPr lang="de-DE"/>
           </a:p>
@@ -2120,7 +2117,7 @@
           <a:p>
             <a:fld id="{29E7901B-09AF-4D4A-907F-86E00F8E0E92}" type="slidenum">
               <a:rPr lang="de-DE" smtClean="0"/>
-              <a:t>‹Nr.›</a:t>
+              <a:t>‹#›</a:t>
             </a:fld>
             <a:endParaRPr lang="de-DE"/>
           </a:p>
@@ -2362,7 +2359,7 @@
           <a:p>
             <a:fld id="{DADE5541-CCBC-45F8-BFC8-A72604CF239D}" type="datetimeFigureOut">
               <a:rPr lang="de-DE" smtClean="0"/>
-              <a:t>13.05.2019</a:t>
+              <a:t>14.05.2019</a:t>
             </a:fld>
             <a:endParaRPr lang="de-DE"/>
           </a:p>
@@ -2404,7 +2401,7 @@
           <a:p>
             <a:fld id="{29E7901B-09AF-4D4A-907F-86E00F8E0E92}" type="slidenum">
               <a:rPr lang="de-DE" smtClean="0"/>
-              <a:t>‹Nr.›</a:t>
+              <a:t>‹#›</a:t>
             </a:fld>
             <a:endParaRPr lang="de-DE"/>
           </a:p>
@@ -2532,7 +2529,7 @@
           <a:p>
             <a:fld id="{DADE5541-CCBC-45F8-BFC8-A72604CF239D}" type="datetimeFigureOut">
               <a:rPr lang="de-DE" smtClean="0"/>
-              <a:t>13.05.2019</a:t>
+              <a:t>14.05.2019</a:t>
             </a:fld>
             <a:endParaRPr lang="de-DE"/>
           </a:p>
@@ -2574,7 +2571,7 @@
           <a:p>
             <a:fld id="{29E7901B-09AF-4D4A-907F-86E00F8E0E92}" type="slidenum">
               <a:rPr lang="de-DE" smtClean="0"/>
-              <a:t>‹Nr.›</a:t>
+              <a:t>‹#›</a:t>
             </a:fld>
             <a:endParaRPr lang="de-DE"/>
           </a:p>
@@ -2796,7 +2793,7 @@
           <a:p>
             <a:fld id="{DADE5541-CCBC-45F8-BFC8-A72604CF239D}" type="datetimeFigureOut">
               <a:rPr lang="de-DE" smtClean="0"/>
-              <a:t>13.05.2019</a:t>
+              <a:t>14.05.2019</a:t>
             </a:fld>
             <a:endParaRPr lang="de-DE"/>
           </a:p>
@@ -2838,7 +2835,7 @@
           <a:p>
             <a:fld id="{29E7901B-09AF-4D4A-907F-86E00F8E0E92}" type="slidenum">
               <a:rPr lang="de-DE" smtClean="0"/>
-              <a:t>‹Nr.›</a:t>
+              <a:t>‹#›</a:t>
             </a:fld>
             <a:endParaRPr lang="de-DE"/>
           </a:p>
@@ -2966,7 +2963,7 @@
           <a:p>
             <a:fld id="{DADE5541-CCBC-45F8-BFC8-A72604CF239D}" type="datetimeFigureOut">
               <a:rPr lang="de-DE" smtClean="0"/>
-              <a:t>13.05.2019</a:t>
+              <a:t>14.05.2019</a:t>
             </a:fld>
             <a:endParaRPr lang="de-DE"/>
           </a:p>
@@ -3008,7 +3005,7 @@
           <a:p>
             <a:fld id="{29E7901B-09AF-4D4A-907F-86E00F8E0E92}" type="slidenum">
               <a:rPr lang="de-DE" smtClean="0"/>
-              <a:t>‹Nr.›</a:t>
+              <a:t>‹#›</a:t>
             </a:fld>
             <a:endParaRPr lang="de-DE"/>
           </a:p>
@@ -3146,7 +3143,7 @@
           <a:p>
             <a:fld id="{DADE5541-CCBC-45F8-BFC8-A72604CF239D}" type="datetimeFigureOut">
               <a:rPr lang="de-DE" smtClean="0"/>
-              <a:t>13.05.2019</a:t>
+              <a:t>14.05.2019</a:t>
             </a:fld>
             <a:endParaRPr lang="de-DE"/>
           </a:p>
@@ -3188,7 +3185,7 @@
           <a:p>
             <a:fld id="{29E7901B-09AF-4D4A-907F-86E00F8E0E92}" type="slidenum">
               <a:rPr lang="de-DE" smtClean="0"/>
-              <a:t>‹Nr.›</a:t>
+              <a:t>‹#›</a:t>
             </a:fld>
             <a:endParaRPr lang="de-DE"/>
           </a:p>
@@ -3433,7 +3430,7 @@
           <a:p>
             <a:fld id="{DADE5541-CCBC-45F8-BFC8-A72604CF239D}" type="datetimeFigureOut">
               <a:rPr lang="de-DE" smtClean="0"/>
-              <a:t>13.05.2019</a:t>
+              <a:t>14.05.2019</a:t>
             </a:fld>
             <a:endParaRPr lang="de-DE"/>
           </a:p>
@@ -3475,7 +3472,7 @@
           <a:p>
             <a:fld id="{29E7901B-09AF-4D4A-907F-86E00F8E0E92}" type="slidenum">
               <a:rPr lang="de-DE" smtClean="0"/>
-              <a:t>‹Nr.›</a:t>
+              <a:t>‹#›</a:t>
             </a:fld>
             <a:endParaRPr lang="de-DE"/>
           </a:p>
@@ -3641,7 +3638,7 @@
           <a:p>
             <a:fld id="{DADE5541-CCBC-45F8-BFC8-A72604CF239D}" type="datetimeFigureOut">
               <a:rPr lang="de-DE" smtClean="0"/>
-              <a:t>13.05.2019</a:t>
+              <a:t>14.05.2019</a:t>
             </a:fld>
             <a:endParaRPr lang="de-DE"/>
           </a:p>
@@ -3683,7 +3680,7 @@
           <a:p>
             <a:fld id="{29E7901B-09AF-4D4A-907F-86E00F8E0E92}" type="slidenum">
               <a:rPr lang="de-DE" smtClean="0"/>
-              <a:t>‹Nr.›</a:t>
+              <a:t>‹#›</a:t>
             </a:fld>
             <a:endParaRPr lang="de-DE"/>
           </a:p>
@@ -3984,7 +3981,7 @@
           <a:p>
             <a:fld id="{DADE5541-CCBC-45F8-BFC8-A72604CF239D}" type="datetimeFigureOut">
               <a:rPr lang="de-DE" smtClean="0"/>
-              <a:t>13.05.2019</a:t>
+              <a:t>14.05.2019</a:t>
             </a:fld>
             <a:endParaRPr lang="de-DE"/>
           </a:p>
@@ -4026,7 +4023,7 @@
           <a:p>
             <a:fld id="{29E7901B-09AF-4D4A-907F-86E00F8E0E92}" type="slidenum">
               <a:rPr lang="de-DE" smtClean="0"/>
-              <a:t>‹Nr.›</a:t>
+              <a:t>‹#›</a:t>
             </a:fld>
             <a:endParaRPr lang="de-DE"/>
           </a:p>
@@ -4259,7 +4256,7 @@
           <a:p>
             <a:fld id="{DADE5541-CCBC-45F8-BFC8-A72604CF239D}" type="datetimeFigureOut">
               <a:rPr lang="de-DE" smtClean="0"/>
-              <a:t>13.05.2019</a:t>
+              <a:t>14.05.2019</a:t>
             </a:fld>
             <a:endParaRPr lang="de-DE"/>
           </a:p>
@@ -4301,7 +4298,7 @@
           <a:p>
             <a:fld id="{29E7901B-09AF-4D4A-907F-86E00F8E0E92}" type="slidenum">
               <a:rPr lang="de-DE" smtClean="0"/>
-              <a:t>‹Nr.›</a:t>
+              <a:t>‹#›</a:t>
             </a:fld>
             <a:endParaRPr lang="de-DE"/>
           </a:p>
@@ -4638,7 +4635,7 @@
           <a:p>
             <a:fld id="{DADE5541-CCBC-45F8-BFC8-A72604CF239D}" type="datetimeFigureOut">
               <a:rPr lang="de-DE" smtClean="0"/>
-              <a:t>13.05.2019</a:t>
+              <a:t>14.05.2019</a:t>
             </a:fld>
             <a:endParaRPr lang="de-DE"/>
           </a:p>
@@ -4680,7 +4677,7 @@
           <a:p>
             <a:fld id="{29E7901B-09AF-4D4A-907F-86E00F8E0E92}" type="slidenum">
               <a:rPr lang="de-DE" smtClean="0"/>
-              <a:t>‹Nr.›</a:t>
+              <a:t>‹#›</a:t>
             </a:fld>
             <a:endParaRPr lang="de-DE"/>
           </a:p>
@@ -4756,7 +4753,7 @@
           <a:p>
             <a:fld id="{DADE5541-CCBC-45F8-BFC8-A72604CF239D}" type="datetimeFigureOut">
               <a:rPr lang="de-DE" smtClean="0"/>
-              <a:t>13.05.2019</a:t>
+              <a:t>14.05.2019</a:t>
             </a:fld>
             <a:endParaRPr lang="de-DE"/>
           </a:p>
@@ -4798,7 +4795,7 @@
           <a:p>
             <a:fld id="{29E7901B-09AF-4D4A-907F-86E00F8E0E92}" type="slidenum">
               <a:rPr lang="de-DE" smtClean="0"/>
-              <a:t>‹Nr.›</a:t>
+              <a:t>‹#›</a:t>
             </a:fld>
             <a:endParaRPr lang="de-DE"/>
           </a:p>
@@ -4927,7 +4924,7 @@
           <a:p>
             <a:fld id="{DADE5541-CCBC-45F8-BFC8-A72604CF239D}" type="datetimeFigureOut">
               <a:rPr lang="de-DE" smtClean="0"/>
-              <a:t>13.05.2019</a:t>
+              <a:t>14.05.2019</a:t>
             </a:fld>
             <a:endParaRPr lang="de-DE"/>
           </a:p>
@@ -4977,7 +4974,7 @@
           <a:p>
             <a:fld id="{29E7901B-09AF-4D4A-907F-86E00F8E0E92}" type="slidenum">
               <a:rPr lang="de-DE" smtClean="0"/>
-              <a:t>‹Nr.›</a:t>
+              <a:t>‹#›</a:t>
             </a:fld>
             <a:endParaRPr lang="de-DE"/>
           </a:p>
@@ -5186,7 +5183,7 @@
           <a:p>
             <a:fld id="{DADE5541-CCBC-45F8-BFC8-A72604CF239D}" type="datetimeFigureOut">
               <a:rPr lang="de-DE" smtClean="0"/>
-              <a:t>13.05.2019</a:t>
+              <a:t>14.05.2019</a:t>
             </a:fld>
             <a:endParaRPr lang="de-DE"/>
           </a:p>
@@ -5228,7 +5225,7 @@
           <a:p>
             <a:fld id="{29E7901B-09AF-4D4A-907F-86E00F8E0E92}" type="slidenum">
               <a:rPr lang="de-DE" smtClean="0"/>
-              <a:t>‹Nr.›</a:t>
+              <a:t>‹#›</a:t>
             </a:fld>
             <a:endParaRPr lang="de-DE"/>
           </a:p>
@@ -5532,7 +5529,7 @@
           <a:p>
             <a:fld id="{DADE5541-CCBC-45F8-BFC8-A72604CF239D}" type="datetimeFigureOut">
               <a:rPr lang="de-DE" smtClean="0"/>
-              <a:t>13.05.2019</a:t>
+              <a:t>14.05.2019</a:t>
             </a:fld>
             <a:endParaRPr lang="de-DE"/>
           </a:p>
@@ -5595,7 +5592,7 @@
           <a:p>
             <a:fld id="{29E7901B-09AF-4D4A-907F-86E00F8E0E92}" type="slidenum">
               <a:rPr lang="de-DE" smtClean="0"/>
-              <a:t>‹Nr.›</a:t>
+              <a:t>‹#›</a:t>
             </a:fld>
             <a:endParaRPr lang="de-DE"/>
           </a:p>
@@ -5909,7 +5906,7 @@
           <a:p>
             <a:fld id="{DADE5541-CCBC-45F8-BFC8-A72604CF239D}" type="datetimeFigureOut">
               <a:rPr lang="de-DE" smtClean="0"/>
-              <a:t>13.05.2019</a:t>
+              <a:t>14.05.2019</a:t>
             </a:fld>
             <a:endParaRPr lang="de-DE"/>
           </a:p>
@@ -5951,7 +5948,7 @@
           <a:p>
             <a:fld id="{29E7901B-09AF-4D4A-907F-86E00F8E0E92}" type="slidenum">
               <a:rPr lang="de-DE" smtClean="0"/>
-              <a:t>‹Nr.›</a:t>
+              <a:t>‹#›</a:t>
             </a:fld>
             <a:endParaRPr lang="de-DE"/>
           </a:p>
@@ -6079,7 +6076,7 @@
           <a:p>
             <a:fld id="{DADE5541-CCBC-45F8-BFC8-A72604CF239D}" type="datetimeFigureOut">
               <a:rPr lang="de-DE" smtClean="0"/>
-              <a:t>13.05.2019</a:t>
+              <a:t>14.05.2019</a:t>
             </a:fld>
             <a:endParaRPr lang="de-DE"/>
           </a:p>
@@ -6121,7 +6118,7 @@
           <a:p>
             <a:fld id="{29E7901B-09AF-4D4A-907F-86E00F8E0E92}" type="slidenum">
               <a:rPr lang="de-DE" smtClean="0"/>
-              <a:t>‹Nr.›</a:t>
+              <a:t>‹#›</a:t>
             </a:fld>
             <a:endParaRPr lang="de-DE"/>
           </a:p>
@@ -6335,7 +6332,7 @@
           <a:p>
             <a:fld id="{DADE5541-CCBC-45F8-BFC8-A72604CF239D}" type="datetimeFigureOut">
               <a:rPr lang="de-DE" smtClean="0"/>
-              <a:t>13.05.2019</a:t>
+              <a:t>14.05.2019</a:t>
             </a:fld>
             <a:endParaRPr lang="de-DE"/>
           </a:p>
@@ -6377,7 +6374,7 @@
           <a:p>
             <a:fld id="{29E7901B-09AF-4D4A-907F-86E00F8E0E92}" type="slidenum">
               <a:rPr lang="de-DE" smtClean="0"/>
-              <a:t>‹Nr.›</a:t>
+              <a:t>‹#›</a:t>
             </a:fld>
             <a:endParaRPr lang="de-DE"/>
           </a:p>
@@ -6567,7 +6564,7 @@
           <a:p>
             <a:fld id="{DADE5541-CCBC-45F8-BFC8-A72604CF239D}" type="datetimeFigureOut">
               <a:rPr lang="de-DE" smtClean="0"/>
-              <a:t>13.05.2019</a:t>
+              <a:t>14.05.2019</a:t>
             </a:fld>
             <a:endParaRPr lang="de-DE"/>
           </a:p>
@@ -6609,7 +6606,7 @@
           <a:p>
             <a:fld id="{29E7901B-09AF-4D4A-907F-86E00F8E0E92}" type="slidenum">
               <a:rPr lang="de-DE" smtClean="0"/>
-              <a:t>‹Nr.›</a:t>
+              <a:t>‹#›</a:t>
             </a:fld>
             <a:endParaRPr lang="de-DE"/>
           </a:p>
@@ -6914,7 +6911,7 @@
           <a:p>
             <a:fld id="{DADE5541-CCBC-45F8-BFC8-A72604CF239D}" type="datetimeFigureOut">
               <a:rPr lang="de-DE" smtClean="0"/>
-              <a:t>13.05.2019</a:t>
+              <a:t>14.05.2019</a:t>
             </a:fld>
             <a:endParaRPr lang="de-DE"/>
           </a:p>
@@ -6956,7 +6953,7 @@
           <a:p>
             <a:fld id="{29E7901B-09AF-4D4A-907F-86E00F8E0E92}" type="slidenum">
               <a:rPr lang="de-DE" smtClean="0"/>
-              <a:t>‹Nr.›</a:t>
+              <a:t>‹#›</a:t>
             </a:fld>
             <a:endParaRPr lang="de-DE"/>
           </a:p>
@@ -7032,7 +7029,7 @@
           <a:p>
             <a:fld id="{DADE5541-CCBC-45F8-BFC8-A72604CF239D}" type="datetimeFigureOut">
               <a:rPr lang="de-DE" smtClean="0"/>
-              <a:t>13.05.2019</a:t>
+              <a:t>14.05.2019</a:t>
             </a:fld>
             <a:endParaRPr lang="de-DE"/>
           </a:p>
@@ -7074,7 +7071,7 @@
           <a:p>
             <a:fld id="{29E7901B-09AF-4D4A-907F-86E00F8E0E92}" type="slidenum">
               <a:rPr lang="de-DE" smtClean="0"/>
-              <a:t>‹Nr.›</a:t>
+              <a:t>‹#›</a:t>
             </a:fld>
             <a:endParaRPr lang="de-DE"/>
           </a:p>
@@ -7150,7 +7147,7 @@
           <a:p>
             <a:fld id="{DADE5541-CCBC-45F8-BFC8-A72604CF239D}" type="datetimeFigureOut">
               <a:rPr lang="de-DE" smtClean="0"/>
-              <a:t>13.05.2019</a:t>
+              <a:t>14.05.2019</a:t>
             </a:fld>
             <a:endParaRPr lang="de-DE"/>
           </a:p>
@@ -7192,7 +7189,7 @@
           <a:p>
             <a:fld id="{29E7901B-09AF-4D4A-907F-86E00F8E0E92}" type="slidenum">
               <a:rPr lang="de-DE" smtClean="0"/>
-              <a:t>‹Nr.›</a:t>
+              <a:t>‹#›</a:t>
             </a:fld>
             <a:endParaRPr lang="de-DE"/>
           </a:p>
@@ -7434,7 +7431,7 @@
           <a:p>
             <a:fld id="{DADE5541-CCBC-45F8-BFC8-A72604CF239D}" type="datetimeFigureOut">
               <a:rPr lang="de-DE" smtClean="0"/>
-              <a:t>13.05.2019</a:t>
+              <a:t>14.05.2019</a:t>
             </a:fld>
             <a:endParaRPr lang="de-DE"/>
           </a:p>
@@ -7476,7 +7473,7 @@
           <a:p>
             <a:fld id="{29E7901B-09AF-4D4A-907F-86E00F8E0E92}" type="slidenum">
               <a:rPr lang="de-DE" smtClean="0"/>
-              <a:t>‹Nr.›</a:t>
+              <a:t>‹#›</a:t>
             </a:fld>
             <a:endParaRPr lang="de-DE"/>
           </a:p>
@@ -7698,7 +7695,7 @@
           <a:p>
             <a:fld id="{DADE5541-CCBC-45F8-BFC8-A72604CF239D}" type="datetimeFigureOut">
               <a:rPr lang="de-DE" smtClean="0"/>
-              <a:t>13.05.2019</a:t>
+              <a:t>14.05.2019</a:t>
             </a:fld>
             <a:endParaRPr lang="de-DE"/>
           </a:p>
@@ -7740,7 +7737,7 @@
           <a:p>
             <a:fld id="{29E7901B-09AF-4D4A-907F-86E00F8E0E92}" type="slidenum">
               <a:rPr lang="de-DE" smtClean="0"/>
-              <a:t>‹Nr.›</a:t>
+              <a:t>‹#›</a:t>
             </a:fld>
             <a:endParaRPr lang="de-DE"/>
           </a:p>
@@ -7912,7 +7909,7 @@
           <a:p>
             <a:fld id="{DADE5541-CCBC-45F8-BFC8-A72604CF239D}" type="datetimeFigureOut">
               <a:rPr lang="de-DE" smtClean="0"/>
-              <a:t>13.05.2019</a:t>
+              <a:t>14.05.2019</a:t>
             </a:fld>
             <a:endParaRPr lang="de-DE"/>
           </a:p>
@@ -7991,7 +7988,7 @@
           <a:p>
             <a:fld id="{29E7901B-09AF-4D4A-907F-86E00F8E0E92}" type="slidenum">
               <a:rPr lang="de-DE" smtClean="0"/>
-              <a:t>‹Nr.›</a:t>
+              <a:t>‹#›</a:t>
             </a:fld>
             <a:endParaRPr lang="de-DE"/>
           </a:p>
@@ -8442,7 +8439,7 @@
           <a:p>
             <a:fld id="{DADE5541-CCBC-45F8-BFC8-A72604CF239D}" type="datetimeFigureOut">
               <a:rPr lang="de-DE" smtClean="0"/>
-              <a:t>13.05.2019</a:t>
+              <a:t>14.05.2019</a:t>
             </a:fld>
             <a:endParaRPr lang="de-DE"/>
           </a:p>
@@ -8521,7 +8518,7 @@
           <a:p>
             <a:fld id="{29E7901B-09AF-4D4A-907F-86E00F8E0E92}" type="slidenum">
               <a:rPr lang="de-DE" smtClean="0"/>
-              <a:t>‹Nr.›</a:t>
+              <a:t>‹#›</a:t>
             </a:fld>
             <a:endParaRPr lang="de-DE"/>
           </a:p>
@@ -9045,7 +9042,7 @@
           <a:p>
             <a:fld id="{DADE5541-CCBC-45F8-BFC8-A72604CF239D}" type="datetimeFigureOut">
               <a:rPr lang="de-DE" smtClean="0"/>
-              <a:t>13.05.2019</a:t>
+              <a:t>14.05.2019</a:t>
             </a:fld>
             <a:endParaRPr lang="de-DE"/>
           </a:p>
@@ -9119,7 +9116,7 @@
           <a:p>
             <a:fld id="{29E7901B-09AF-4D4A-907F-86E00F8E0E92}" type="slidenum">
               <a:rPr lang="de-DE" smtClean="0"/>
-              <a:t>‹Nr.›</a:t>
+              <a:t>‹#›</a:t>
             </a:fld>
             <a:endParaRPr lang="de-DE"/>
           </a:p>
@@ -9574,7 +9571,7 @@
           <p:cNvPr id="2" name="Titel 1">
             <a:extLst>
               <a:ext uri="{FF2B5EF4-FFF2-40B4-BE49-F238E27FC236}">
-                <a16:creationId xmlns:a16="http://schemas.microsoft.com/office/drawing/2014/main" id="{90A6468B-D0CD-4DC7-A3AD-DA2E2B071416}"/>
+                <a16:creationId xmlns:a16="http://schemas.microsoft.com/office/drawing/2014/main" xmlns="" id="{90A6468B-D0CD-4DC7-A3AD-DA2E2B071416}"/>
               </a:ext>
             </a:extLst>
           </p:cNvPr>
@@ -9602,7 +9599,7 @@
           <p:cNvPr id="3" name="Untertitel 2">
             <a:extLst>
               <a:ext uri="{FF2B5EF4-FFF2-40B4-BE49-F238E27FC236}">
-                <a16:creationId xmlns:a16="http://schemas.microsoft.com/office/drawing/2014/main" id="{65A5BDD7-952D-4603-93C5-6E59619C765A}"/>
+                <a16:creationId xmlns:a16="http://schemas.microsoft.com/office/drawing/2014/main" xmlns="" id="{65A5BDD7-952D-4603-93C5-6E59619C765A}"/>
               </a:ext>
             </a:extLst>
           </p:cNvPr>
@@ -9660,7 +9657,7 @@
           <p:cNvPr id="2" name="Titel 1">
             <a:extLst>
               <a:ext uri="{FF2B5EF4-FFF2-40B4-BE49-F238E27FC236}">
-                <a16:creationId xmlns:a16="http://schemas.microsoft.com/office/drawing/2014/main" id="{40A94760-C413-460F-B002-DE3FCCA70BA3}"/>
+                <a16:creationId xmlns:a16="http://schemas.microsoft.com/office/drawing/2014/main" xmlns="" id="{40A94760-C413-460F-B002-DE3FCCA70BA3}"/>
               </a:ext>
             </a:extLst>
           </p:cNvPr>
@@ -9688,7 +9685,7 @@
           <p:cNvPr id="5" name="Grafik 4">
             <a:extLst>
               <a:ext uri="{FF2B5EF4-FFF2-40B4-BE49-F238E27FC236}">
-                <a16:creationId xmlns:a16="http://schemas.microsoft.com/office/drawing/2014/main" id="{57A3AA90-FDF7-4D08-B8F5-9FF4A8D4BC7E}"/>
+                <a16:creationId xmlns:a16="http://schemas.microsoft.com/office/drawing/2014/main" xmlns="" id="{57A3AA90-FDF7-4D08-B8F5-9FF4A8D4BC7E}"/>
               </a:ext>
             </a:extLst>
           </p:cNvPr>
@@ -9724,7 +9721,7 @@
           <p:cNvPr id="6" name="Textfeld 5">
             <a:extLst>
               <a:ext uri="{FF2B5EF4-FFF2-40B4-BE49-F238E27FC236}">
-                <a16:creationId xmlns:a16="http://schemas.microsoft.com/office/drawing/2014/main" id="{6AA4F5E1-8797-42F3-A52D-711C0EF03F4D}"/>
+                <a16:creationId xmlns:a16="http://schemas.microsoft.com/office/drawing/2014/main" xmlns="" id="{6AA4F5E1-8797-42F3-A52D-711C0EF03F4D}"/>
               </a:ext>
             </a:extLst>
           </p:cNvPr>
@@ -9734,7 +9731,7 @@
         <p:spPr>
           <a:xfrm>
             <a:off x="4199890" y="2200275"/>
-            <a:ext cx="7255320" cy="3785652"/>
+            <a:ext cx="8033097" cy="3785652"/>
           </a:xfrm>
           <a:prstGeom prst="rect">
             <a:avLst/>
@@ -9879,11 +9876,23 @@
               <a:t>Images </a:t>
             </a:r>
             <a:r>
-              <a:rPr lang="de-DE" sz="2000" dirty="0" err="1"/>
+              <a:rPr lang="de-DE" sz="2000" dirty="0" smtClean="0"/>
+              <a:t>(28x28=784 </a:t>
+            </a:r>
+            <a:r>
+              <a:rPr lang="de-DE" sz="2000" dirty="0" err="1" smtClean="0"/>
+              <a:t>pixels</a:t>
+            </a:r>
+            <a:r>
+              <a:rPr lang="de-DE" sz="2000" dirty="0" smtClean="0"/>
+              <a:t>) </a:t>
+            </a:r>
+            <a:r>
+              <a:rPr lang="de-DE" sz="2000" dirty="0" err="1" smtClean="0"/>
               <a:t>of</a:t>
             </a:r>
             <a:r>
-              <a:rPr lang="de-DE" sz="2000" dirty="0"/>
+              <a:rPr lang="de-DE" sz="2000" dirty="0" smtClean="0"/>
               <a:t> </a:t>
             </a:r>
             <a:r>
@@ -10035,7 +10044,7 @@
           <p:cNvPr id="2" name="Titel 1">
             <a:extLst>
               <a:ext uri="{FF2B5EF4-FFF2-40B4-BE49-F238E27FC236}">
-                <a16:creationId xmlns:a16="http://schemas.microsoft.com/office/drawing/2014/main" id="{6239617A-843A-48A9-B1A1-5A51ECFC1EAB}"/>
+                <a16:creationId xmlns:a16="http://schemas.microsoft.com/office/drawing/2014/main" xmlns="" id="{6239617A-843A-48A9-B1A1-5A51ECFC1EAB}"/>
               </a:ext>
             </a:extLst>
           </p:cNvPr>
@@ -10068,7 +10077,7 @@
           <p:cNvPr id="5" name="Grafik 4">
             <a:extLst>
               <a:ext uri="{FF2B5EF4-FFF2-40B4-BE49-F238E27FC236}">
-                <a16:creationId xmlns:a16="http://schemas.microsoft.com/office/drawing/2014/main" id="{4D499231-1623-4F5D-81A2-30732BDEC5EE}"/>
+                <a16:creationId xmlns:a16="http://schemas.microsoft.com/office/drawing/2014/main" xmlns="" id="{4D499231-1623-4F5D-81A2-30732BDEC5EE}"/>
               </a:ext>
             </a:extLst>
           </p:cNvPr>
@@ -10104,7 +10113,7 @@
           <p:cNvPr id="6" name="Tabelle 5">
             <a:extLst>
               <a:ext uri="{FF2B5EF4-FFF2-40B4-BE49-F238E27FC236}">
-                <a16:creationId xmlns:a16="http://schemas.microsoft.com/office/drawing/2014/main" id="{078A32C6-762C-44BB-BFAD-E9CCE572CA41}"/>
+                <a16:creationId xmlns:a16="http://schemas.microsoft.com/office/drawing/2014/main" xmlns="" id="{078A32C6-762C-44BB-BFAD-E9CCE572CA41}"/>
               </a:ext>
             </a:extLst>
           </p:cNvPr>
@@ -10133,42 +10142,42 @@
                 <a:gridCol w="1204914">
                   <a:extLst>
                     <a:ext uri="{9D8B030D-6E8A-4147-A177-3AD203B41FA5}">
-                      <a16:colId xmlns:a16="http://schemas.microsoft.com/office/drawing/2014/main" val="2935268419"/>
+                      <a16:colId xmlns:a16="http://schemas.microsoft.com/office/drawing/2014/main" xmlns="" val="2935268419"/>
                     </a:ext>
                   </a:extLst>
                 </a:gridCol>
                 <a:gridCol w="1112773">
                   <a:extLst>
                     <a:ext uri="{9D8B030D-6E8A-4147-A177-3AD203B41FA5}">
-                      <a16:colId xmlns:a16="http://schemas.microsoft.com/office/drawing/2014/main" val="3573326846"/>
+                      <a16:colId xmlns:a16="http://schemas.microsoft.com/office/drawing/2014/main" xmlns="" val="3573326846"/>
                     </a:ext>
                   </a:extLst>
                 </a:gridCol>
                 <a:gridCol w="1297045">
                   <a:extLst>
                     <a:ext uri="{9D8B030D-6E8A-4147-A177-3AD203B41FA5}">
-                      <a16:colId xmlns:a16="http://schemas.microsoft.com/office/drawing/2014/main" val="3944536420"/>
+                      <a16:colId xmlns:a16="http://schemas.microsoft.com/office/drawing/2014/main" xmlns="" val="3944536420"/>
                     </a:ext>
                   </a:extLst>
                 </a:gridCol>
                 <a:gridCol w="1204914">
                   <a:extLst>
                     <a:ext uri="{9D8B030D-6E8A-4147-A177-3AD203B41FA5}">
-                      <a16:colId xmlns:a16="http://schemas.microsoft.com/office/drawing/2014/main" val="1040886641"/>
+                      <a16:colId xmlns:a16="http://schemas.microsoft.com/office/drawing/2014/main" xmlns="" val="1040886641"/>
                     </a:ext>
                   </a:extLst>
                 </a:gridCol>
                 <a:gridCol w="1204914">
                   <a:extLst>
                     <a:ext uri="{9D8B030D-6E8A-4147-A177-3AD203B41FA5}">
-                      <a16:colId xmlns:a16="http://schemas.microsoft.com/office/drawing/2014/main" val="3540853296"/>
+                      <a16:colId xmlns:a16="http://schemas.microsoft.com/office/drawing/2014/main" xmlns="" val="3540853296"/>
                     </a:ext>
                   </a:extLst>
                 </a:gridCol>
                 <a:gridCol w="1204914">
                   <a:extLst>
                     <a:ext uri="{9D8B030D-6E8A-4147-A177-3AD203B41FA5}">
-                      <a16:colId xmlns:a16="http://schemas.microsoft.com/office/drawing/2014/main" val="174494649"/>
+                      <a16:colId xmlns:a16="http://schemas.microsoft.com/office/drawing/2014/main" xmlns="" val="174494649"/>
                     </a:ext>
                   </a:extLst>
                 </a:gridCol>
@@ -10257,7 +10266,7 @@
                 </a:tc>
                 <a:extLst>
                   <a:ext uri="{0D108BD9-81ED-4DB2-BD59-A6C34878D82A}">
-                    <a16:rowId xmlns:a16="http://schemas.microsoft.com/office/drawing/2014/main" val="2824275686"/>
+                    <a16:rowId xmlns:a16="http://schemas.microsoft.com/office/drawing/2014/main" xmlns="" val="2824275686"/>
                   </a:ext>
                 </a:extLst>
               </a:tr>
@@ -10348,7 +10357,7 @@
                 </a:tc>
                 <a:extLst>
                   <a:ext uri="{0D108BD9-81ED-4DB2-BD59-A6C34878D82A}">
-                    <a16:rowId xmlns:a16="http://schemas.microsoft.com/office/drawing/2014/main" val="1457480322"/>
+                    <a16:rowId xmlns:a16="http://schemas.microsoft.com/office/drawing/2014/main" xmlns="" val="1457480322"/>
                   </a:ext>
                 </a:extLst>
               </a:tr>
@@ -10439,7 +10448,7 @@
                 </a:tc>
                 <a:extLst>
                   <a:ext uri="{0D108BD9-81ED-4DB2-BD59-A6C34878D82A}">
-                    <a16:rowId xmlns:a16="http://schemas.microsoft.com/office/drawing/2014/main" val="3884194282"/>
+                    <a16:rowId xmlns:a16="http://schemas.microsoft.com/office/drawing/2014/main" xmlns="" val="3884194282"/>
                   </a:ext>
                 </a:extLst>
               </a:tr>
@@ -10530,7 +10539,7 @@
                 </a:tc>
                 <a:extLst>
                   <a:ext uri="{0D108BD9-81ED-4DB2-BD59-A6C34878D82A}">
-                    <a16:rowId xmlns:a16="http://schemas.microsoft.com/office/drawing/2014/main" val="2227270537"/>
+                    <a16:rowId xmlns:a16="http://schemas.microsoft.com/office/drawing/2014/main" xmlns="" val="2227270537"/>
                   </a:ext>
                 </a:extLst>
               </a:tr>
@@ -10621,7 +10630,7 @@
                 </a:tc>
                 <a:extLst>
                   <a:ext uri="{0D108BD9-81ED-4DB2-BD59-A6C34878D82A}">
-                    <a16:rowId xmlns:a16="http://schemas.microsoft.com/office/drawing/2014/main" val="828193998"/>
+                    <a16:rowId xmlns:a16="http://schemas.microsoft.com/office/drawing/2014/main" xmlns="" val="828193998"/>
                   </a:ext>
                 </a:extLst>
               </a:tr>
@@ -10712,7 +10721,7 @@
                 </a:tc>
                 <a:extLst>
                   <a:ext uri="{0D108BD9-81ED-4DB2-BD59-A6C34878D82A}">
-                    <a16:rowId xmlns:a16="http://schemas.microsoft.com/office/drawing/2014/main" val="2216999364"/>
+                    <a16:rowId xmlns:a16="http://schemas.microsoft.com/office/drawing/2014/main" xmlns="" val="2216999364"/>
                   </a:ext>
                 </a:extLst>
               </a:tr>
@@ -10803,7 +10812,7 @@
                 </a:tc>
                 <a:extLst>
                   <a:ext uri="{0D108BD9-81ED-4DB2-BD59-A6C34878D82A}">
-                    <a16:rowId xmlns:a16="http://schemas.microsoft.com/office/drawing/2014/main" val="1739809223"/>
+                    <a16:rowId xmlns:a16="http://schemas.microsoft.com/office/drawing/2014/main" xmlns="" val="1739809223"/>
                   </a:ext>
                 </a:extLst>
               </a:tr>
@@ -10894,7 +10903,7 @@
                 </a:tc>
                 <a:extLst>
                   <a:ext uri="{0D108BD9-81ED-4DB2-BD59-A6C34878D82A}">
-                    <a16:rowId xmlns:a16="http://schemas.microsoft.com/office/drawing/2014/main" val="3065424001"/>
+                    <a16:rowId xmlns:a16="http://schemas.microsoft.com/office/drawing/2014/main" xmlns="" val="3065424001"/>
                   </a:ext>
                 </a:extLst>
               </a:tr>
@@ -10907,7 +10916,7 @@
           <p:cNvPr id="7" name="Pfeil: nach rechts 6">
             <a:extLst>
               <a:ext uri="{FF2B5EF4-FFF2-40B4-BE49-F238E27FC236}">
-                <a16:creationId xmlns:a16="http://schemas.microsoft.com/office/drawing/2014/main" id="{3B513CA0-A832-43E7-B050-E2AF2D0420A5}"/>
+                <a16:creationId xmlns:a16="http://schemas.microsoft.com/office/drawing/2014/main" xmlns="" id="{3B513CA0-A832-43E7-B050-E2AF2D0420A5}"/>
               </a:ext>
             </a:extLst>
           </p:cNvPr>
@@ -10953,7 +10962,7 @@
           <p:cNvPr id="3" name="Textfeld 2">
             <a:extLst>
               <a:ext uri="{FF2B5EF4-FFF2-40B4-BE49-F238E27FC236}">
-                <a16:creationId xmlns:a16="http://schemas.microsoft.com/office/drawing/2014/main" id="{93110ADA-DF8C-4D4A-885A-EDB004AE3CF1}"/>
+                <a16:creationId xmlns:a16="http://schemas.microsoft.com/office/drawing/2014/main" xmlns="" id="{93110ADA-DF8C-4D4A-885A-EDB004AE3CF1}"/>
               </a:ext>
             </a:extLst>
           </p:cNvPr>
@@ -11025,7 +11034,7 @@
           <p:cNvPr id="8" name="Grafik 7" descr="Ein Bild, das Gebäude enthält.&#10;&#10;Automatisch generierte Beschreibung">
             <a:extLst>
               <a:ext uri="{FF2B5EF4-FFF2-40B4-BE49-F238E27FC236}">
-                <a16:creationId xmlns:a16="http://schemas.microsoft.com/office/drawing/2014/main" id="{1D323D9C-FC8D-4439-91A6-7135C579E851}"/>
+                <a16:creationId xmlns:a16="http://schemas.microsoft.com/office/drawing/2014/main" xmlns="" id="{1D323D9C-FC8D-4439-91A6-7135C579E851}"/>
               </a:ext>
             </a:extLst>
           </p:cNvPr>
@@ -11212,7 +11221,7 @@
           <p:cNvPr id="2" name="Titel 1">
             <a:extLst>
               <a:ext uri="{FF2B5EF4-FFF2-40B4-BE49-F238E27FC236}">
-                <a16:creationId xmlns:a16="http://schemas.microsoft.com/office/drawing/2014/main" id="{DE62BF7E-ADBC-4B3B-8BAB-95D01E311AED}"/>
+                <a16:creationId xmlns:a16="http://schemas.microsoft.com/office/drawing/2014/main" xmlns="" id="{DE62BF7E-ADBC-4B3B-8BAB-95D01E311AED}"/>
               </a:ext>
             </a:extLst>
           </p:cNvPr>
@@ -11256,7 +11265,7 @@
           <p:cNvPr id="8" name="Gerade Verbindung mit Pfeil 7">
             <a:extLst>
               <a:ext uri="{FF2B5EF4-FFF2-40B4-BE49-F238E27FC236}">
-                <a16:creationId xmlns:a16="http://schemas.microsoft.com/office/drawing/2014/main" id="{A79B7D31-8930-4A5A-AA1C-06892CC18291}"/>
+                <a16:creationId xmlns:a16="http://schemas.microsoft.com/office/drawing/2014/main" xmlns="" id="{A79B7D31-8930-4A5A-AA1C-06892CC18291}"/>
               </a:ext>
             </a:extLst>
           </p:cNvPr>
@@ -11297,7 +11306,7 @@
           <p:cNvPr id="11" name="Gerade Verbindung mit Pfeil 10">
             <a:extLst>
               <a:ext uri="{FF2B5EF4-FFF2-40B4-BE49-F238E27FC236}">
-                <a16:creationId xmlns:a16="http://schemas.microsoft.com/office/drawing/2014/main" id="{193B10F6-7A53-474E-BC21-C9DDCDE704C0}"/>
+                <a16:creationId xmlns:a16="http://schemas.microsoft.com/office/drawing/2014/main" xmlns="" id="{193B10F6-7A53-474E-BC21-C9DDCDE704C0}"/>
               </a:ext>
             </a:extLst>
           </p:cNvPr>
@@ -11338,7 +11347,7 @@
           <p:cNvPr id="13" name="Ellipse 12">
             <a:extLst>
               <a:ext uri="{FF2B5EF4-FFF2-40B4-BE49-F238E27FC236}">
-                <a16:creationId xmlns:a16="http://schemas.microsoft.com/office/drawing/2014/main" id="{7469256C-C83A-4F95-96CA-1818F8942C6D}"/>
+                <a16:creationId xmlns:a16="http://schemas.microsoft.com/office/drawing/2014/main" xmlns="" id="{7469256C-C83A-4F95-96CA-1818F8942C6D}"/>
               </a:ext>
             </a:extLst>
           </p:cNvPr>
@@ -11384,7 +11393,7 @@
           <p:cNvPr id="14" name="Ellipse 13">
             <a:extLst>
               <a:ext uri="{FF2B5EF4-FFF2-40B4-BE49-F238E27FC236}">
-                <a16:creationId xmlns:a16="http://schemas.microsoft.com/office/drawing/2014/main" id="{FC6EE53D-2964-4925-B51C-31D899033BB5}"/>
+                <a16:creationId xmlns:a16="http://schemas.microsoft.com/office/drawing/2014/main" xmlns="" id="{FC6EE53D-2964-4925-B51C-31D899033BB5}"/>
               </a:ext>
             </a:extLst>
           </p:cNvPr>
@@ -11430,7 +11439,7 @@
           <p:cNvPr id="15" name="Ellipse 14">
             <a:extLst>
               <a:ext uri="{FF2B5EF4-FFF2-40B4-BE49-F238E27FC236}">
-                <a16:creationId xmlns:a16="http://schemas.microsoft.com/office/drawing/2014/main" id="{58ADDE1C-EA42-455F-8EA6-B8E3BAE0272F}"/>
+                <a16:creationId xmlns:a16="http://schemas.microsoft.com/office/drawing/2014/main" xmlns="" id="{58ADDE1C-EA42-455F-8EA6-B8E3BAE0272F}"/>
               </a:ext>
             </a:extLst>
           </p:cNvPr>
@@ -11476,7 +11485,7 @@
           <p:cNvPr id="16" name="Ellipse 15">
             <a:extLst>
               <a:ext uri="{FF2B5EF4-FFF2-40B4-BE49-F238E27FC236}">
-                <a16:creationId xmlns:a16="http://schemas.microsoft.com/office/drawing/2014/main" id="{896F73C8-8F04-4CC6-97C4-1DD7B5E41760}"/>
+                <a16:creationId xmlns:a16="http://schemas.microsoft.com/office/drawing/2014/main" xmlns="" id="{896F73C8-8F04-4CC6-97C4-1DD7B5E41760}"/>
               </a:ext>
             </a:extLst>
           </p:cNvPr>
@@ -11522,7 +11531,7 @@
           <p:cNvPr id="17" name="Ellipse 16">
             <a:extLst>
               <a:ext uri="{FF2B5EF4-FFF2-40B4-BE49-F238E27FC236}">
-                <a16:creationId xmlns:a16="http://schemas.microsoft.com/office/drawing/2014/main" id="{E834ED1C-E0F9-4D80-BC22-E8D5FF875936}"/>
+                <a16:creationId xmlns:a16="http://schemas.microsoft.com/office/drawing/2014/main" xmlns="" id="{E834ED1C-E0F9-4D80-BC22-E8D5FF875936}"/>
               </a:ext>
             </a:extLst>
           </p:cNvPr>
@@ -11576,7 +11585,7 @@
           <p:cNvPr id="18" name="Ellipse 17">
             <a:extLst>
               <a:ext uri="{FF2B5EF4-FFF2-40B4-BE49-F238E27FC236}">
-                <a16:creationId xmlns:a16="http://schemas.microsoft.com/office/drawing/2014/main" id="{D9C9DB88-0D38-44B0-8D62-510C1934DB2C}"/>
+                <a16:creationId xmlns:a16="http://schemas.microsoft.com/office/drawing/2014/main" xmlns="" id="{D9C9DB88-0D38-44B0-8D62-510C1934DB2C}"/>
               </a:ext>
             </a:extLst>
           </p:cNvPr>
@@ -11630,7 +11639,7 @@
           <p:cNvPr id="19" name="Ellipse 18">
             <a:extLst>
               <a:ext uri="{FF2B5EF4-FFF2-40B4-BE49-F238E27FC236}">
-                <a16:creationId xmlns:a16="http://schemas.microsoft.com/office/drawing/2014/main" id="{AF5D232C-9B44-46DD-9434-43BE9D322187}"/>
+                <a16:creationId xmlns:a16="http://schemas.microsoft.com/office/drawing/2014/main" xmlns="" id="{AF5D232C-9B44-46DD-9434-43BE9D322187}"/>
               </a:ext>
             </a:extLst>
           </p:cNvPr>
@@ -11684,7 +11693,7 @@
           <p:cNvPr id="20" name="Ellipse 19">
             <a:extLst>
               <a:ext uri="{FF2B5EF4-FFF2-40B4-BE49-F238E27FC236}">
-                <a16:creationId xmlns:a16="http://schemas.microsoft.com/office/drawing/2014/main" id="{7DBB5383-166E-4F55-B5DA-3A43707886C8}"/>
+                <a16:creationId xmlns:a16="http://schemas.microsoft.com/office/drawing/2014/main" xmlns="" id="{7DBB5383-166E-4F55-B5DA-3A43707886C8}"/>
               </a:ext>
             </a:extLst>
           </p:cNvPr>
@@ -11738,7 +11747,7 @@
           <p:cNvPr id="21" name="Rechteck 20">
             <a:extLst>
               <a:ext uri="{FF2B5EF4-FFF2-40B4-BE49-F238E27FC236}">
-                <a16:creationId xmlns:a16="http://schemas.microsoft.com/office/drawing/2014/main" id="{557170D4-743C-4500-AC84-115677CC29C7}"/>
+                <a16:creationId xmlns:a16="http://schemas.microsoft.com/office/drawing/2014/main" xmlns="" id="{557170D4-743C-4500-AC84-115677CC29C7}"/>
               </a:ext>
             </a:extLst>
           </p:cNvPr>
@@ -11785,7 +11794,7 @@
           <p:cNvPr id="22" name="Rechteck 21">
             <a:extLst>
               <a:ext uri="{FF2B5EF4-FFF2-40B4-BE49-F238E27FC236}">
-                <a16:creationId xmlns:a16="http://schemas.microsoft.com/office/drawing/2014/main" id="{CB6D8A3C-1082-4255-9556-0AE3CBADAAC2}"/>
+                <a16:creationId xmlns:a16="http://schemas.microsoft.com/office/drawing/2014/main" xmlns="" id="{CB6D8A3C-1082-4255-9556-0AE3CBADAAC2}"/>
               </a:ext>
             </a:extLst>
           </p:cNvPr>
@@ -11837,7 +11846,7 @@
           <p:cNvPr id="23" name="Stern: 5 Zacken 22">
             <a:extLst>
               <a:ext uri="{FF2B5EF4-FFF2-40B4-BE49-F238E27FC236}">
-                <a16:creationId xmlns:a16="http://schemas.microsoft.com/office/drawing/2014/main" id="{30ACAD23-06F1-4109-8CB7-3983EAC26B6E}"/>
+                <a16:creationId xmlns:a16="http://schemas.microsoft.com/office/drawing/2014/main" xmlns="" id="{30ACAD23-06F1-4109-8CB7-3983EAC26B6E}"/>
               </a:ext>
             </a:extLst>
           </p:cNvPr>
@@ -11891,7 +11900,7 @@
           <p:cNvPr id="24" name="Ellipse 23">
             <a:extLst>
               <a:ext uri="{FF2B5EF4-FFF2-40B4-BE49-F238E27FC236}">
-                <a16:creationId xmlns:a16="http://schemas.microsoft.com/office/drawing/2014/main" id="{1E130FB0-31E0-48E1-BBE6-B0DDCA3F1952}"/>
+                <a16:creationId xmlns:a16="http://schemas.microsoft.com/office/drawing/2014/main" xmlns="" id="{1E130FB0-31E0-48E1-BBE6-B0DDCA3F1952}"/>
               </a:ext>
             </a:extLst>
           </p:cNvPr>
@@ -11943,7 +11952,7 @@
           <p:cNvPr id="25" name="Ellipse 24">
             <a:extLst>
               <a:ext uri="{FF2B5EF4-FFF2-40B4-BE49-F238E27FC236}">
-                <a16:creationId xmlns:a16="http://schemas.microsoft.com/office/drawing/2014/main" id="{909F81B8-BBC3-41DE-BFEA-18D8DE20A4A0}"/>
+                <a16:creationId xmlns:a16="http://schemas.microsoft.com/office/drawing/2014/main" xmlns="" id="{909F81B8-BBC3-41DE-BFEA-18D8DE20A4A0}"/>
               </a:ext>
             </a:extLst>
           </p:cNvPr>
@@ -11995,7 +12004,7 @@
           <p:cNvPr id="26" name="Textfeld 25">
             <a:extLst>
               <a:ext uri="{FF2B5EF4-FFF2-40B4-BE49-F238E27FC236}">
-                <a16:creationId xmlns:a16="http://schemas.microsoft.com/office/drawing/2014/main" id="{E1A66F3B-E0D0-47BD-BF9A-2E68700102D7}"/>
+                <a16:creationId xmlns:a16="http://schemas.microsoft.com/office/drawing/2014/main" xmlns="" id="{E1A66F3B-E0D0-47BD-BF9A-2E68700102D7}"/>
               </a:ext>
             </a:extLst>
           </p:cNvPr>
@@ -12678,7 +12687,7 @@
           <p:cNvPr id="2" name="Titel 1">
             <a:extLst>
               <a:ext uri="{FF2B5EF4-FFF2-40B4-BE49-F238E27FC236}">
-                <a16:creationId xmlns:a16="http://schemas.microsoft.com/office/drawing/2014/main" id="{2D19F794-8599-4A1D-A689-743EBDA80DB4}"/>
+                <a16:creationId xmlns:a16="http://schemas.microsoft.com/office/drawing/2014/main" xmlns="" id="{2D19F794-8599-4A1D-A689-743EBDA80DB4}"/>
               </a:ext>
             </a:extLst>
           </p:cNvPr>
@@ -12718,7 +12727,7 @@
           <p:cNvPr id="4" name="Textfeld 3">
             <a:extLst>
               <a:ext uri="{FF2B5EF4-FFF2-40B4-BE49-F238E27FC236}">
-                <a16:creationId xmlns:a16="http://schemas.microsoft.com/office/drawing/2014/main" id="{5E36B305-D4C6-4B27-9782-732C3867DEA7}"/>
+                <a16:creationId xmlns:a16="http://schemas.microsoft.com/office/drawing/2014/main" xmlns="" id="{5E36B305-D4C6-4B27-9782-732C3867DEA7}"/>
               </a:ext>
             </a:extLst>
           </p:cNvPr>
@@ -12928,7 +12937,7 @@
           <p:cNvPr id="6" name="Grafik 5">
             <a:extLst>
               <a:ext uri="{FF2B5EF4-FFF2-40B4-BE49-F238E27FC236}">
-                <a16:creationId xmlns:a16="http://schemas.microsoft.com/office/drawing/2014/main" id="{3AB3E07F-C4FB-411C-B517-DEC84D74B4A1}"/>
+                <a16:creationId xmlns:a16="http://schemas.microsoft.com/office/drawing/2014/main" xmlns="" id="{3AB3E07F-C4FB-411C-B517-DEC84D74B4A1}"/>
               </a:ext>
             </a:extLst>
           </p:cNvPr>
@@ -12964,7 +12973,7 @@
           <p:cNvPr id="7" name="Textfeld 6">
             <a:extLst>
               <a:ext uri="{FF2B5EF4-FFF2-40B4-BE49-F238E27FC236}">
-                <a16:creationId xmlns:a16="http://schemas.microsoft.com/office/drawing/2014/main" id="{4ADB41E8-1FE5-4790-81E4-9FA1EA7A680A}"/>
+                <a16:creationId xmlns:a16="http://schemas.microsoft.com/office/drawing/2014/main" xmlns="" id="{4ADB41E8-1FE5-4790-81E4-9FA1EA7A680A}"/>
               </a:ext>
             </a:extLst>
           </p:cNvPr>
@@ -13017,7 +13026,7 @@
           <p:cNvPr id="8" name="Textfeld 7">
             <a:extLst>
               <a:ext uri="{FF2B5EF4-FFF2-40B4-BE49-F238E27FC236}">
-                <a16:creationId xmlns:a16="http://schemas.microsoft.com/office/drawing/2014/main" id="{E07A373C-1875-4D36-BD3C-049E9516B803}"/>
+                <a16:creationId xmlns:a16="http://schemas.microsoft.com/office/drawing/2014/main" xmlns="" id="{E07A373C-1875-4D36-BD3C-049E9516B803}"/>
               </a:ext>
             </a:extLst>
           </p:cNvPr>
@@ -13081,6 +13090,13 @@
   <p:clrMapOvr>
     <a:masterClrMapping/>
   </p:clrMapOvr>
+  <p:timing>
+    <p:tnLst>
+      <p:par>
+        <p:cTn id="1" dur="indefinite" restart="never" nodeType="tmRoot"/>
+      </p:par>
+    </p:tnLst>
+  </p:timing>
 </p:sld>
 </file>
 
@@ -13106,7 +13122,7 @@
           <p:cNvPr id="2" name="Titel 1">
             <a:extLst>
               <a:ext uri="{FF2B5EF4-FFF2-40B4-BE49-F238E27FC236}">
-                <a16:creationId xmlns:a16="http://schemas.microsoft.com/office/drawing/2014/main" id="{256EF4DE-DBD9-44AA-86D5-14A5C169F82A}"/>
+                <a16:creationId xmlns:a16="http://schemas.microsoft.com/office/drawing/2014/main" xmlns="" id="{256EF4DE-DBD9-44AA-86D5-14A5C169F82A}"/>
               </a:ext>
             </a:extLst>
           </p:cNvPr>
@@ -13162,7 +13178,7 @@
           <p:cNvPr id="4" name="Textfeld 3">
             <a:extLst>
               <a:ext uri="{FF2B5EF4-FFF2-40B4-BE49-F238E27FC236}">
-                <a16:creationId xmlns:a16="http://schemas.microsoft.com/office/drawing/2014/main" id="{AE4C0C6E-2766-45EA-A93B-6AABFDD3F619}"/>
+                <a16:creationId xmlns:a16="http://schemas.microsoft.com/office/drawing/2014/main" xmlns="" id="{AE4C0C6E-2766-45EA-A93B-6AABFDD3F619}"/>
               </a:ext>
             </a:extLst>
           </p:cNvPr>
@@ -13376,7 +13392,7 @@
           <p:cNvPr id="5" name="Grafik 4" descr="Ein Bild, das Text, Karte enthält.&#10;&#10;Automatisch generierte Beschreibung">
             <a:extLst>
               <a:ext uri="{FF2B5EF4-FFF2-40B4-BE49-F238E27FC236}">
-                <a16:creationId xmlns:a16="http://schemas.microsoft.com/office/drawing/2014/main" id="{88B2EE34-B8EE-4BF1-B3D1-6B70C86D7DA7}"/>
+                <a16:creationId xmlns:a16="http://schemas.microsoft.com/office/drawing/2014/main" xmlns="" id="{88B2EE34-B8EE-4BF1-B3D1-6B70C86D7DA7}"/>
               </a:ext>
             </a:extLst>
           </p:cNvPr>
@@ -13411,7 +13427,7 @@
           <p:cNvPr id="7" name="Grafik 6" descr="Ein Bild, das Karte, Text enthält.&#10;&#10;Automatisch generierte Beschreibung">
             <a:extLst>
               <a:ext uri="{FF2B5EF4-FFF2-40B4-BE49-F238E27FC236}">
-                <a16:creationId xmlns:a16="http://schemas.microsoft.com/office/drawing/2014/main" id="{0CBA23CC-576A-4326-8AB4-E0E78200582D}"/>
+                <a16:creationId xmlns:a16="http://schemas.microsoft.com/office/drawing/2014/main" xmlns="" id="{0CBA23CC-576A-4326-8AB4-E0E78200582D}"/>
               </a:ext>
             </a:extLst>
           </p:cNvPr>
@@ -13446,7 +13462,7 @@
           <p:cNvPr id="8" name="Textfeld 7">
             <a:extLst>
               <a:ext uri="{FF2B5EF4-FFF2-40B4-BE49-F238E27FC236}">
-                <a16:creationId xmlns:a16="http://schemas.microsoft.com/office/drawing/2014/main" id="{715A02E8-97E5-43DC-A343-4B63BB73A948}"/>
+                <a16:creationId xmlns:a16="http://schemas.microsoft.com/office/drawing/2014/main" xmlns="" id="{715A02E8-97E5-43DC-A343-4B63BB73A948}"/>
               </a:ext>
             </a:extLst>
           </p:cNvPr>
@@ -13510,6 +13526,13 @@
   <p:clrMapOvr>
     <a:masterClrMapping/>
   </p:clrMapOvr>
+  <p:timing>
+    <p:tnLst>
+      <p:par>
+        <p:cTn id="1" dur="indefinite" restart="never" nodeType="tmRoot"/>
+      </p:par>
+    </p:tnLst>
+  </p:timing>
 </p:sld>
 </file>
 
@@ -13535,7 +13558,7 @@
           <p:cNvPr id="2" name="Titel 1">
             <a:extLst>
               <a:ext uri="{FF2B5EF4-FFF2-40B4-BE49-F238E27FC236}">
-                <a16:creationId xmlns:a16="http://schemas.microsoft.com/office/drawing/2014/main" id="{3A0DF07A-A6C0-4B8E-B7C2-439EA1742EBF}"/>
+                <a16:creationId xmlns:a16="http://schemas.microsoft.com/office/drawing/2014/main" xmlns="" id="{3A0DF07A-A6C0-4B8E-B7C2-439EA1742EBF}"/>
               </a:ext>
             </a:extLst>
           </p:cNvPr>
@@ -13564,7 +13587,7 @@
           <p:cNvPr id="4" name="Textfeld 3">
             <a:extLst>
               <a:ext uri="{FF2B5EF4-FFF2-40B4-BE49-F238E27FC236}">
-                <a16:creationId xmlns:a16="http://schemas.microsoft.com/office/drawing/2014/main" id="{E0AF8BE7-4D29-4120-8B6C-C0617FC4823E}"/>
+                <a16:creationId xmlns:a16="http://schemas.microsoft.com/office/drawing/2014/main" xmlns="" id="{E0AF8BE7-4D29-4120-8B6C-C0617FC4823E}"/>
               </a:ext>
             </a:extLst>
           </p:cNvPr>
@@ -13604,6 +13627,14 @@
               <a:t> </a:t>
             </a:r>
             <a:r>
+              <a:rPr lang="de-DE" sz="2000" dirty="0" err="1" smtClean="0"/>
+              <a:t>consists</a:t>
+            </a:r>
+            <a:r>
+              <a:rPr lang="de-DE" sz="2000" dirty="0"/>
+              <a:t> </a:t>
+            </a:r>
+            <a:r>
               <a:rPr lang="de-DE" sz="2000" dirty="0" err="1"/>
               <a:t>only</a:t>
             </a:r>
@@ -13612,8 +13643,24 @@
               <a:t> </a:t>
             </a:r>
             <a:r>
+              <a:rPr lang="de-DE" sz="2000" dirty="0" err="1" smtClean="0"/>
+              <a:t>of</a:t>
+            </a:r>
+            <a:r>
+              <a:rPr lang="de-DE" sz="2000" dirty="0" smtClean="0"/>
+              <a:t> </a:t>
+            </a:r>
+            <a:r>
               <a:rPr lang="de-DE" sz="2000" dirty="0" err="1"/>
-              <a:t>consists</a:t>
+              <a:t>numbers</a:t>
+            </a:r>
+            <a:r>
+              <a:rPr lang="de-DE" sz="2000" dirty="0"/>
+              <a:t>, so </a:t>
+            </a:r>
+            <a:r>
+              <a:rPr lang="de-DE" sz="2000" dirty="0" err="1"/>
+              <a:t>we</a:t>
             </a:r>
             <a:r>
               <a:rPr lang="de-DE" sz="2000" dirty="0"/>
@@ -13621,31 +13668,7 @@
             </a:r>
             <a:r>
               <a:rPr lang="de-DE" sz="2000" dirty="0" err="1"/>
-              <a:t>of</a:t>
-            </a:r>
-            <a:r>
-              <a:rPr lang="de-DE" sz="2000" dirty="0"/>
-              <a:t> </a:t>
-            </a:r>
-            <a:r>
-              <a:rPr lang="de-DE" sz="2000" dirty="0" err="1"/>
-              <a:t>numbers</a:t>
-            </a:r>
-            <a:r>
-              <a:rPr lang="de-DE" sz="2000" dirty="0"/>
-              <a:t>, so </a:t>
-            </a:r>
-            <a:r>
-              <a:rPr lang="de-DE" sz="2000" dirty="0" err="1"/>
-              <a:t>we</a:t>
-            </a:r>
-            <a:r>
-              <a:rPr lang="de-DE" sz="2000" dirty="0"/>
-              <a:t> reverse-</a:t>
-            </a:r>
-            <a:r>
-              <a:rPr lang="de-DE" sz="2000" dirty="0" err="1"/>
-              <a:t>transform</a:t>
+              <a:t>reverse-transform</a:t>
             </a:r>
             <a:r>
               <a:rPr lang="de-DE" sz="2000" dirty="0"/>
@@ -13699,7 +13722,7 @@
           <p:cNvPr id="5" name="Grafik 4">
             <a:extLst>
               <a:ext uri="{FF2B5EF4-FFF2-40B4-BE49-F238E27FC236}">
-                <a16:creationId xmlns:a16="http://schemas.microsoft.com/office/drawing/2014/main" id="{7EACE29B-80D8-462B-B157-449C327A0E60}"/>
+                <a16:creationId xmlns:a16="http://schemas.microsoft.com/office/drawing/2014/main" xmlns="" id="{7EACE29B-80D8-462B-B157-449C327A0E60}"/>
               </a:ext>
             </a:extLst>
           </p:cNvPr>
@@ -13709,7 +13732,7 @@
           <p:nvPr/>
         </p:nvPicPr>
         <p:blipFill>
-          <a:blip r:embed="rId2">
+          <a:blip r:embed="rId2" cstate="print">
             <a:extLst>
               <a:ext uri="{28A0092B-C50C-407E-A947-70E740481C1C}">
                 <a14:useLocalDpi xmlns:a14="http://schemas.microsoft.com/office/drawing/2010/main" val="0"/>
@@ -13735,7 +13758,7 @@
           <p:cNvPr id="7" name="Pfeil: nach rechts 6">
             <a:extLst>
               <a:ext uri="{FF2B5EF4-FFF2-40B4-BE49-F238E27FC236}">
-                <a16:creationId xmlns:a16="http://schemas.microsoft.com/office/drawing/2014/main" id="{EBAB8428-19FC-46B4-86D1-06DA423F5159}"/>
+                <a16:creationId xmlns:a16="http://schemas.microsoft.com/office/drawing/2014/main" xmlns="" id="{EBAB8428-19FC-46B4-86D1-06DA423F5159}"/>
               </a:ext>
             </a:extLst>
           </p:cNvPr>
@@ -13781,7 +13804,7 @@
           <p:cNvPr id="8" name="Textfeld 7">
             <a:extLst>
               <a:ext uri="{FF2B5EF4-FFF2-40B4-BE49-F238E27FC236}">
-                <a16:creationId xmlns:a16="http://schemas.microsoft.com/office/drawing/2014/main" id="{4B38B57E-ED9C-41B4-B178-0A690D45CEFC}"/>
+                <a16:creationId xmlns:a16="http://schemas.microsoft.com/office/drawing/2014/main" xmlns="" id="{4B38B57E-ED9C-41B4-B178-0A690D45CEFC}"/>
               </a:ext>
             </a:extLst>
           </p:cNvPr>
@@ -13874,7 +13897,7 @@
           <p:cNvPr id="9" name="Textfeld 8">
             <a:extLst>
               <a:ext uri="{FF2B5EF4-FFF2-40B4-BE49-F238E27FC236}">
-                <a16:creationId xmlns:a16="http://schemas.microsoft.com/office/drawing/2014/main" id="{B8B5B46E-131F-4826-B800-2829288C4A99}"/>
+                <a16:creationId xmlns:a16="http://schemas.microsoft.com/office/drawing/2014/main" xmlns="" id="{B8B5B46E-131F-4826-B800-2829288C4A99}"/>
               </a:ext>
             </a:extLst>
           </p:cNvPr>
@@ -13930,7 +13953,7 @@
           <p:cNvPr id="10" name="Tabelle 9">
             <a:extLst>
               <a:ext uri="{FF2B5EF4-FFF2-40B4-BE49-F238E27FC236}">
-                <a16:creationId xmlns:a16="http://schemas.microsoft.com/office/drawing/2014/main" id="{1359DF27-0431-40C1-AAEA-10323C33B724}"/>
+                <a16:creationId xmlns:a16="http://schemas.microsoft.com/office/drawing/2014/main" xmlns="" id="{1359DF27-0431-40C1-AAEA-10323C33B724}"/>
               </a:ext>
             </a:extLst>
           </p:cNvPr>
@@ -13959,28 +13982,28 @@
                 <a:gridCol w="1127349">
                   <a:extLst>
                     <a:ext uri="{9D8B030D-6E8A-4147-A177-3AD203B41FA5}">
-                      <a16:colId xmlns:a16="http://schemas.microsoft.com/office/drawing/2014/main" val="2935268419"/>
+                      <a16:colId xmlns:a16="http://schemas.microsoft.com/office/drawing/2014/main" xmlns="" val="2935268419"/>
                     </a:ext>
                   </a:extLst>
                 </a:gridCol>
                 <a:gridCol w="1041139">
                   <a:extLst>
                     <a:ext uri="{9D8B030D-6E8A-4147-A177-3AD203B41FA5}">
-                      <a16:colId xmlns:a16="http://schemas.microsoft.com/office/drawing/2014/main" val="3573326846"/>
+                      <a16:colId xmlns:a16="http://schemas.microsoft.com/office/drawing/2014/main" xmlns="" val="3573326846"/>
                     </a:ext>
                   </a:extLst>
                 </a:gridCol>
                 <a:gridCol w="1127349">
                   <a:extLst>
                     <a:ext uri="{9D8B030D-6E8A-4147-A177-3AD203B41FA5}">
-                      <a16:colId xmlns:a16="http://schemas.microsoft.com/office/drawing/2014/main" val="3540853296"/>
+                      <a16:colId xmlns:a16="http://schemas.microsoft.com/office/drawing/2014/main" xmlns="" val="3540853296"/>
                     </a:ext>
                   </a:extLst>
                 </a:gridCol>
                 <a:gridCol w="1127349">
                   <a:extLst>
                     <a:ext uri="{9D8B030D-6E8A-4147-A177-3AD203B41FA5}">
-                      <a16:colId xmlns:a16="http://schemas.microsoft.com/office/drawing/2014/main" val="174494649"/>
+                      <a16:colId xmlns:a16="http://schemas.microsoft.com/office/drawing/2014/main" xmlns="" val="174494649"/>
                     </a:ext>
                   </a:extLst>
                 </a:gridCol>
@@ -14041,7 +14064,7 @@
                 </a:tc>
                 <a:extLst>
                   <a:ext uri="{0D108BD9-81ED-4DB2-BD59-A6C34878D82A}">
-                    <a16:rowId xmlns:a16="http://schemas.microsoft.com/office/drawing/2014/main" val="2824275686"/>
+                    <a16:rowId xmlns:a16="http://schemas.microsoft.com/office/drawing/2014/main" xmlns="" val="2824275686"/>
                   </a:ext>
                 </a:extLst>
               </a:tr>
@@ -14104,7 +14127,7 @@
                 </a:tc>
                 <a:extLst>
                   <a:ext uri="{0D108BD9-81ED-4DB2-BD59-A6C34878D82A}">
-                    <a16:rowId xmlns:a16="http://schemas.microsoft.com/office/drawing/2014/main" val="1457480322"/>
+                    <a16:rowId xmlns:a16="http://schemas.microsoft.com/office/drawing/2014/main" xmlns="" val="1457480322"/>
                   </a:ext>
                 </a:extLst>
               </a:tr>
@@ -14167,7 +14190,7 @@
                 </a:tc>
                 <a:extLst>
                   <a:ext uri="{0D108BD9-81ED-4DB2-BD59-A6C34878D82A}">
-                    <a16:rowId xmlns:a16="http://schemas.microsoft.com/office/drawing/2014/main" val="3884194282"/>
+                    <a16:rowId xmlns:a16="http://schemas.microsoft.com/office/drawing/2014/main" xmlns="" val="3884194282"/>
                   </a:ext>
                 </a:extLst>
               </a:tr>
@@ -14230,7 +14253,7 @@
                 </a:tc>
                 <a:extLst>
                   <a:ext uri="{0D108BD9-81ED-4DB2-BD59-A6C34878D82A}">
-                    <a16:rowId xmlns:a16="http://schemas.microsoft.com/office/drawing/2014/main" val="2216999364"/>
+                    <a16:rowId xmlns:a16="http://schemas.microsoft.com/office/drawing/2014/main" xmlns="" val="2216999364"/>
                   </a:ext>
                 </a:extLst>
               </a:tr>
@@ -14293,7 +14316,7 @@
                 </a:tc>
                 <a:extLst>
                   <a:ext uri="{0D108BD9-81ED-4DB2-BD59-A6C34878D82A}">
-                    <a16:rowId xmlns:a16="http://schemas.microsoft.com/office/drawing/2014/main" val="1739809223"/>
+                    <a16:rowId xmlns:a16="http://schemas.microsoft.com/office/drawing/2014/main" xmlns="" val="1739809223"/>
                   </a:ext>
                 </a:extLst>
               </a:tr>
@@ -14356,7 +14379,7 @@
                 </a:tc>
                 <a:extLst>
                   <a:ext uri="{0D108BD9-81ED-4DB2-BD59-A6C34878D82A}">
-                    <a16:rowId xmlns:a16="http://schemas.microsoft.com/office/drawing/2014/main" val="3065424001"/>
+                    <a16:rowId xmlns:a16="http://schemas.microsoft.com/office/drawing/2014/main" xmlns="" val="3065424001"/>
                   </a:ext>
                 </a:extLst>
               </a:tr>
@@ -14374,6 +14397,13 @@
   <p:clrMapOvr>
     <a:masterClrMapping/>
   </p:clrMapOvr>
+  <p:timing>
+    <p:tnLst>
+      <p:par>
+        <p:cTn id="1" dur="indefinite" restart="never" nodeType="tmRoot"/>
+      </p:par>
+    </p:tnLst>
+  </p:timing>
 </p:sld>
 </file>
 
@@ -14399,7 +14429,7 @@
           <p:cNvPr id="2" name="Titel 1">
             <a:extLst>
               <a:ext uri="{FF2B5EF4-FFF2-40B4-BE49-F238E27FC236}">
-                <a16:creationId xmlns:a16="http://schemas.microsoft.com/office/drawing/2014/main" id="{FD425221-F4E0-416C-8FB0-F41F029F15A2}"/>
+                <a16:creationId xmlns:a16="http://schemas.microsoft.com/office/drawing/2014/main" xmlns="" id="{FD425221-F4E0-416C-8FB0-F41F029F15A2}"/>
               </a:ext>
             </a:extLst>
           </p:cNvPr>
@@ -14428,7 +14458,7 @@
           <p:cNvPr id="4" name="Rechteck 3">
             <a:extLst>
               <a:ext uri="{FF2B5EF4-FFF2-40B4-BE49-F238E27FC236}">
-                <a16:creationId xmlns:a16="http://schemas.microsoft.com/office/drawing/2014/main" id="{3C144FCF-8160-45CB-AF72-B1E01D48110B}"/>
+                <a16:creationId xmlns:a16="http://schemas.microsoft.com/office/drawing/2014/main" xmlns="" id="{3C144FCF-8160-45CB-AF72-B1E01D48110B}"/>
               </a:ext>
             </a:extLst>
           </p:cNvPr>
@@ -14505,7 +14535,7 @@
           <p:cNvPr id="5" name="Rechteck 4">
             <a:extLst>
               <a:ext uri="{FF2B5EF4-FFF2-40B4-BE49-F238E27FC236}">
-                <a16:creationId xmlns:a16="http://schemas.microsoft.com/office/drawing/2014/main" id="{D20448F9-72C8-413F-9D70-4409E2DE11C8}"/>
+                <a16:creationId xmlns:a16="http://schemas.microsoft.com/office/drawing/2014/main" xmlns="" id="{D20448F9-72C8-413F-9D70-4409E2DE11C8}"/>
               </a:ext>
             </a:extLst>
           </p:cNvPr>
@@ -14561,7 +14591,7 @@
           <p:cNvPr id="6" name="Rechteck 5">
             <a:extLst>
               <a:ext uri="{FF2B5EF4-FFF2-40B4-BE49-F238E27FC236}">
-                <a16:creationId xmlns:a16="http://schemas.microsoft.com/office/drawing/2014/main" id="{5180D00F-FD97-4A25-8D38-2CA232B64C83}"/>
+                <a16:creationId xmlns:a16="http://schemas.microsoft.com/office/drawing/2014/main" xmlns="" id="{5180D00F-FD97-4A25-8D38-2CA232B64C83}"/>
               </a:ext>
             </a:extLst>
           </p:cNvPr>
@@ -14617,7 +14647,7 @@
           <p:cNvPr id="7" name="Rechteck 6">
             <a:extLst>
               <a:ext uri="{FF2B5EF4-FFF2-40B4-BE49-F238E27FC236}">
-                <a16:creationId xmlns:a16="http://schemas.microsoft.com/office/drawing/2014/main" id="{A3652C8A-EF34-443B-BEB8-8B5DF46B51EB}"/>
+                <a16:creationId xmlns:a16="http://schemas.microsoft.com/office/drawing/2014/main" xmlns="" id="{A3652C8A-EF34-443B-BEB8-8B5DF46B51EB}"/>
               </a:ext>
             </a:extLst>
           </p:cNvPr>
@@ -14682,7 +14712,7 @@
           <p:cNvPr id="8" name="Rechteck 7">
             <a:extLst>
               <a:ext uri="{FF2B5EF4-FFF2-40B4-BE49-F238E27FC236}">
-                <a16:creationId xmlns:a16="http://schemas.microsoft.com/office/drawing/2014/main" id="{CB67835D-B0D2-4792-AD45-26DF015FBC36}"/>
+                <a16:creationId xmlns:a16="http://schemas.microsoft.com/office/drawing/2014/main" xmlns="" id="{CB67835D-B0D2-4792-AD45-26DF015FBC36}"/>
               </a:ext>
             </a:extLst>
           </p:cNvPr>
@@ -14739,7 +14769,7 @@
           <p:cNvPr id="9" name="Rechteck 8">
             <a:extLst>
               <a:ext uri="{FF2B5EF4-FFF2-40B4-BE49-F238E27FC236}">
-                <a16:creationId xmlns:a16="http://schemas.microsoft.com/office/drawing/2014/main" id="{D252AD02-69CE-4013-B9CC-1224A53A42F3}"/>
+                <a16:creationId xmlns:a16="http://schemas.microsoft.com/office/drawing/2014/main" xmlns="" id="{D252AD02-69CE-4013-B9CC-1224A53A42F3}"/>
               </a:ext>
             </a:extLst>
           </p:cNvPr>
@@ -14812,7 +14842,7 @@
           <p:cNvPr id="10" name="Rechteck 9">
             <a:extLst>
               <a:ext uri="{FF2B5EF4-FFF2-40B4-BE49-F238E27FC236}">
-                <a16:creationId xmlns:a16="http://schemas.microsoft.com/office/drawing/2014/main" id="{3FCA1C79-AB5E-4320-A47F-958AE6BBE9F2}"/>
+                <a16:creationId xmlns:a16="http://schemas.microsoft.com/office/drawing/2014/main" xmlns="" id="{3FCA1C79-AB5E-4320-A47F-958AE6BBE9F2}"/>
               </a:ext>
             </a:extLst>
           </p:cNvPr>
@@ -14897,7 +14927,7 @@
           <p:cNvPr id="12" name="Gerade Verbindung mit Pfeil 11">
             <a:extLst>
               <a:ext uri="{FF2B5EF4-FFF2-40B4-BE49-F238E27FC236}">
-                <a16:creationId xmlns:a16="http://schemas.microsoft.com/office/drawing/2014/main" id="{FBD46719-C1A0-4F14-B082-F80632595B0B}"/>
+                <a16:creationId xmlns:a16="http://schemas.microsoft.com/office/drawing/2014/main" xmlns="" id="{FBD46719-C1A0-4F14-B082-F80632595B0B}"/>
               </a:ext>
             </a:extLst>
           </p:cNvPr>
@@ -14939,7 +14969,7 @@
           <p:cNvPr id="15" name="Gerade Verbindung mit Pfeil 14">
             <a:extLst>
               <a:ext uri="{FF2B5EF4-FFF2-40B4-BE49-F238E27FC236}">
-                <a16:creationId xmlns:a16="http://schemas.microsoft.com/office/drawing/2014/main" id="{F73EB8DE-6007-4698-90F1-AB21DE6D8866}"/>
+                <a16:creationId xmlns:a16="http://schemas.microsoft.com/office/drawing/2014/main" xmlns="" id="{F73EB8DE-6007-4698-90F1-AB21DE6D8866}"/>
               </a:ext>
             </a:extLst>
           </p:cNvPr>
@@ -14981,7 +15011,7 @@
           <p:cNvPr id="17" name="Gerade Verbindung mit Pfeil 16">
             <a:extLst>
               <a:ext uri="{FF2B5EF4-FFF2-40B4-BE49-F238E27FC236}">
-                <a16:creationId xmlns:a16="http://schemas.microsoft.com/office/drawing/2014/main" id="{68EA95B4-1972-46D5-B3E8-2705355D8206}"/>
+                <a16:creationId xmlns:a16="http://schemas.microsoft.com/office/drawing/2014/main" xmlns="" id="{68EA95B4-1972-46D5-B3E8-2705355D8206}"/>
               </a:ext>
             </a:extLst>
           </p:cNvPr>
@@ -15022,7 +15052,7 @@
           <p:cNvPr id="21" name="Gerade Verbindung mit Pfeil 20">
             <a:extLst>
               <a:ext uri="{FF2B5EF4-FFF2-40B4-BE49-F238E27FC236}">
-                <a16:creationId xmlns:a16="http://schemas.microsoft.com/office/drawing/2014/main" id="{2714CC57-CF7B-4DC0-923E-1DF969389D60}"/>
+                <a16:creationId xmlns:a16="http://schemas.microsoft.com/office/drawing/2014/main" xmlns="" id="{2714CC57-CF7B-4DC0-923E-1DF969389D60}"/>
               </a:ext>
             </a:extLst>
           </p:cNvPr>
@@ -15063,7 +15093,7 @@
           <p:cNvPr id="23" name="Gerade Verbindung mit Pfeil 22">
             <a:extLst>
               <a:ext uri="{FF2B5EF4-FFF2-40B4-BE49-F238E27FC236}">
-                <a16:creationId xmlns:a16="http://schemas.microsoft.com/office/drawing/2014/main" id="{B8AA6557-3089-4109-B91D-BFBCE8968F0A}"/>
+                <a16:creationId xmlns:a16="http://schemas.microsoft.com/office/drawing/2014/main" xmlns="" id="{B8AA6557-3089-4109-B91D-BFBCE8968F0A}"/>
               </a:ext>
             </a:extLst>
           </p:cNvPr>
@@ -15105,7 +15135,7 @@
           <p:cNvPr id="27" name="Gerade Verbindung mit Pfeil 26">
             <a:extLst>
               <a:ext uri="{FF2B5EF4-FFF2-40B4-BE49-F238E27FC236}">
-                <a16:creationId xmlns:a16="http://schemas.microsoft.com/office/drawing/2014/main" id="{3E4A8C46-F5FD-47C9-BD8D-0E332217A07E}"/>
+                <a16:creationId xmlns:a16="http://schemas.microsoft.com/office/drawing/2014/main" xmlns="" id="{3E4A8C46-F5FD-47C9-BD8D-0E332217A07E}"/>
               </a:ext>
             </a:extLst>
           </p:cNvPr>
@@ -15147,7 +15177,7 @@
           <p:cNvPr id="29" name="Textfeld 28">
             <a:extLst>
               <a:ext uri="{FF2B5EF4-FFF2-40B4-BE49-F238E27FC236}">
-                <a16:creationId xmlns:a16="http://schemas.microsoft.com/office/drawing/2014/main" id="{B0FF87C3-674E-402E-9DF8-D2DBC94CBFD1}"/>
+                <a16:creationId xmlns:a16="http://schemas.microsoft.com/office/drawing/2014/main" xmlns="" id="{B0FF87C3-674E-402E-9DF8-D2DBC94CBFD1}"/>
               </a:ext>
             </a:extLst>
           </p:cNvPr>
@@ -15198,7 +15228,7 @@
           <p:cNvPr id="30" name="Rechteck 29">
             <a:extLst>
               <a:ext uri="{FF2B5EF4-FFF2-40B4-BE49-F238E27FC236}">
-                <a16:creationId xmlns:a16="http://schemas.microsoft.com/office/drawing/2014/main" id="{D462E61F-36B7-4D4E-8D16-AA0A2D4CD544}"/>
+                <a16:creationId xmlns:a16="http://schemas.microsoft.com/office/drawing/2014/main" xmlns="" id="{D462E61F-36B7-4D4E-8D16-AA0A2D4CD544}"/>
               </a:ext>
             </a:extLst>
           </p:cNvPr>
@@ -15281,7 +15311,7 @@
           <p:cNvPr id="11" name="Gerade Verbindung mit Pfeil 10">
             <a:extLst>
               <a:ext uri="{FF2B5EF4-FFF2-40B4-BE49-F238E27FC236}">
-                <a16:creationId xmlns:a16="http://schemas.microsoft.com/office/drawing/2014/main" id="{9F99904B-1C35-42EB-9645-2E61A3ECB860}"/>
+                <a16:creationId xmlns:a16="http://schemas.microsoft.com/office/drawing/2014/main" xmlns="" id="{9F99904B-1C35-42EB-9645-2E61A3ECB860}"/>
               </a:ext>
             </a:extLst>
           </p:cNvPr>
@@ -15327,6 +15357,511 @@
   <p:clrMapOvr>
     <a:masterClrMapping/>
   </p:clrMapOvr>
+  <p:timing>
+    <p:tnLst>
+      <p:par>
+        <p:cTn id="1" dur="indefinite" restart="never" nodeType="tmRoot"/>
+      </p:par>
+    </p:tnLst>
+  </p:timing>
+</p:sld>
+</file>
+
+<file path=ppt/slides/slide9.xml><?xml version="1.0" encoding="utf-8"?>
+<p:sld xmlns:a="http://schemas.openxmlformats.org/drawingml/2006/main" xmlns:r="http://schemas.openxmlformats.org/officeDocument/2006/relationships" xmlns:p="http://schemas.openxmlformats.org/presentationml/2006/main">
+  <p:cSld>
+    <p:spTree>
+      <p:nvGrpSpPr>
+        <p:cNvPr id="1" name=""/>
+        <p:cNvGrpSpPr/>
+        <p:nvPr/>
+      </p:nvGrpSpPr>
+      <p:grpSpPr>
+        <a:xfrm>
+          <a:off x="0" y="0"/>
+          <a:ext cx="0" cy="0"/>
+          <a:chOff x="0" y="0"/>
+          <a:chExt cx="0" cy="0"/>
+        </a:xfrm>
+      </p:grpSpPr>
+      <p:sp>
+        <p:nvSpPr>
+          <p:cNvPr id="2" name="Заголовок 1"/>
+          <p:cNvSpPr>
+            <a:spLocks noGrp="1"/>
+          </p:cNvSpPr>
+          <p:nvPr>
+            <p:ph type="title"/>
+          </p:nvPr>
+        </p:nvSpPr>
+        <p:spPr/>
+        <p:txBody>
+          <a:bodyPr/>
+          <a:lstStyle/>
+          <a:p>
+            <a:r>
+              <a:rPr lang="en-US" dirty="0" smtClean="0"/>
+              <a:t>We have time, but we need more!</a:t>
+            </a:r>
+            <a:endParaRPr lang="ru-RU" dirty="0"/>
+          </a:p>
+        </p:txBody>
+      </p:sp>
+      <p:graphicFrame>
+        <p:nvGraphicFramePr>
+          <p:cNvPr id="4" name="Объект 3"/>
+          <p:cNvGraphicFramePr>
+            <a:graphicFrameLocks noGrp="1"/>
+          </p:cNvGraphicFramePr>
+          <p:nvPr>
+            <p:ph idx="1"/>
+            <p:extLst>
+              <p:ext uri="{D42A27DB-BD31-4B8C-83A1-F6EECF244321}">
+                <p14:modId xmlns:p14="http://schemas.microsoft.com/office/powerpoint/2010/main" val="1467771838"/>
+              </p:ext>
+            </p:extLst>
+          </p:nvPr>
+        </p:nvGraphicFramePr>
+        <p:xfrm>
+          <a:off x="1096963" y="1846263"/>
+          <a:ext cx="10058400" cy="4472333"/>
+        </p:xfrm>
+        <a:graphic>
+          <a:graphicData uri="http://schemas.openxmlformats.org/drawingml/2006/table">
+            <a:tbl>
+              <a:tblPr firstRow="1" bandRow="1">
+                <a:tableStyleId>{5C22544A-7EE6-4342-B048-85BDC9FD1C3A}</a:tableStyleId>
+              </a:tblPr>
+              <a:tblGrid>
+                <a:gridCol w="6966382"/>
+                <a:gridCol w="3092018"/>
+              </a:tblGrid>
+              <a:tr h="370840">
+                <a:tc>
+                  <a:txBody>
+                    <a:bodyPr/>
+                    <a:lstStyle/>
+                    <a:p>
+                      <a:r>
+                        <a:rPr lang="en-US" dirty="0" smtClean="0"/>
+                        <a:t>Milestones</a:t>
+                      </a:r>
+                      <a:endParaRPr lang="ru-RU" dirty="0"/>
+                    </a:p>
+                  </a:txBody>
+                  <a:tcPr/>
+                </a:tc>
+                <a:tc>
+                  <a:txBody>
+                    <a:bodyPr/>
+                    <a:lstStyle/>
+                    <a:p>
+                      <a:r>
+                        <a:rPr lang="en-US" dirty="0" smtClean="0"/>
+                        <a:t>Weeks</a:t>
+                      </a:r>
+                      <a:endParaRPr lang="ru-RU" dirty="0"/>
+                    </a:p>
+                  </a:txBody>
+                  <a:tcPr/>
+                </a:tc>
+              </a:tr>
+              <a:tr h="393093">
+                <a:tc>
+                  <a:txBody>
+                    <a:bodyPr/>
+                    <a:lstStyle/>
+                    <a:p>
+                      <a:r>
+                        <a:rPr lang="en-US" dirty="0" smtClean="0"/>
+                        <a:t>Project</a:t>
+                      </a:r>
+                      <a:r>
+                        <a:rPr lang="en-US" baseline="0" dirty="0" smtClean="0"/>
+                        <a:t> proposal + programming skill improving</a:t>
+                      </a:r>
+                      <a:endParaRPr lang="ru-RU" dirty="0"/>
+                    </a:p>
+                  </a:txBody>
+                  <a:tcPr/>
+                </a:tc>
+                <a:tc>
+                  <a:txBody>
+                    <a:bodyPr/>
+                    <a:lstStyle/>
+                    <a:p>
+                      <a:r>
+                        <a:rPr lang="en-US" dirty="0" smtClean="0"/>
+                        <a:t>20</a:t>
+                      </a:r>
+                      <a:endParaRPr lang="ru-RU" dirty="0"/>
+                    </a:p>
+                  </a:txBody>
+                  <a:tcPr/>
+                </a:tc>
+              </a:tr>
+              <a:tr h="370840">
+                <a:tc>
+                  <a:txBody>
+                    <a:bodyPr/>
+                    <a:lstStyle/>
+                    <a:p>
+                      <a:r>
+                        <a:rPr lang="en-US" dirty="0" smtClean="0"/>
+                        <a:t>KNN</a:t>
+                      </a:r>
+                      <a:r>
+                        <a:rPr lang="en-US" baseline="0" dirty="0" smtClean="0"/>
+                        <a:t> in 784 dimensions</a:t>
+                      </a:r>
+                      <a:endParaRPr lang="ru-RU" dirty="0"/>
+                    </a:p>
+                  </a:txBody>
+                  <a:tcPr/>
+                </a:tc>
+                <a:tc>
+                  <a:txBody>
+                    <a:bodyPr/>
+                    <a:lstStyle/>
+                    <a:p>
+                      <a:r>
+                        <a:rPr lang="en-US" dirty="0" smtClean="0"/>
+                        <a:t>21</a:t>
+                      </a:r>
+                      <a:endParaRPr lang="ru-RU" dirty="0"/>
+                    </a:p>
+                  </a:txBody>
+                  <a:tcPr/>
+                </a:tc>
+              </a:tr>
+              <a:tr h="370840">
+                <a:tc>
+                  <a:txBody>
+                    <a:bodyPr/>
+                    <a:lstStyle/>
+                    <a:p>
+                      <a:endParaRPr lang="ru-RU"/>
+                    </a:p>
+                  </a:txBody>
+                  <a:tcPr/>
+                </a:tc>
+                <a:tc>
+                  <a:txBody>
+                    <a:bodyPr/>
+                    <a:lstStyle/>
+                    <a:p>
+                      <a:r>
+                        <a:rPr lang="en-US" dirty="0" smtClean="0"/>
+                        <a:t>22</a:t>
+                      </a:r>
+                      <a:endParaRPr lang="ru-RU" dirty="0"/>
+                    </a:p>
+                  </a:txBody>
+                  <a:tcPr/>
+                </a:tc>
+              </a:tr>
+              <a:tr h="370840">
+                <a:tc>
+                  <a:txBody>
+                    <a:bodyPr/>
+                    <a:lstStyle/>
+                    <a:p>
+                      <a:pPr marL="0" marR="0" indent="0" algn="l" defTabSz="914400" rtl="0" eaLnBrk="1" fontAlgn="auto" latinLnBrk="0" hangingPunct="1">
+                        <a:lnSpc>
+                          <a:spcPct val="100000"/>
+                        </a:lnSpc>
+                        <a:spcBef>
+                          <a:spcPts val="0"/>
+                        </a:spcBef>
+                        <a:spcAft>
+                          <a:spcPts val="0"/>
+                        </a:spcAft>
+                        <a:buClrTx/>
+                        <a:buSzTx/>
+                        <a:buFontTx/>
+                        <a:buNone/>
+                        <a:tabLst/>
+                        <a:defRPr/>
+                      </a:pPr>
+                      <a:r>
+                        <a:rPr lang="en-US" baseline="0" dirty="0" smtClean="0"/>
+                        <a:t>optimal K-number, success-rate from k plotting function</a:t>
+                      </a:r>
+                      <a:endParaRPr lang="ru-RU" dirty="0"/>
+                    </a:p>
+                  </a:txBody>
+                  <a:tcPr/>
+                </a:tc>
+                <a:tc>
+                  <a:txBody>
+                    <a:bodyPr/>
+                    <a:lstStyle/>
+                    <a:p>
+                      <a:r>
+                        <a:rPr lang="en-US" dirty="0" smtClean="0"/>
+                        <a:t>23</a:t>
+                      </a:r>
+                      <a:endParaRPr lang="ru-RU" dirty="0"/>
+                    </a:p>
+                  </a:txBody>
+                  <a:tcPr/>
+                </a:tc>
+              </a:tr>
+              <a:tr h="370840">
+                <a:tc>
+                  <a:txBody>
+                    <a:bodyPr/>
+                    <a:lstStyle/>
+                    <a:p>
+                      <a:r>
+                        <a:rPr lang="en-US" dirty="0" smtClean="0"/>
+                        <a:t>Visualization </a:t>
+                      </a:r>
+                      <a:r>
+                        <a:rPr lang="en-US" dirty="0" smtClean="0"/>
+                        <a:t>of recognized/falsely</a:t>
+                      </a:r>
+                      <a:r>
+                        <a:rPr lang="en-US" baseline="0" dirty="0" smtClean="0"/>
+                        <a:t> </a:t>
+                      </a:r>
+                      <a:r>
+                        <a:rPr lang="en-US" baseline="0" dirty="0" smtClean="0"/>
+                        <a:t>recognized </a:t>
+                      </a:r>
+                      <a:r>
+                        <a:rPr lang="en-US" baseline="0" dirty="0" smtClean="0"/>
+                        <a:t>digits </a:t>
+                      </a:r>
+                      <a:endParaRPr lang="ru-RU" dirty="0"/>
+                    </a:p>
+                  </a:txBody>
+                  <a:tcPr/>
+                </a:tc>
+                <a:tc>
+                  <a:txBody>
+                    <a:bodyPr/>
+                    <a:lstStyle/>
+                    <a:p>
+                      <a:r>
+                        <a:rPr lang="en-US" dirty="0" smtClean="0"/>
+                        <a:t>24</a:t>
+                      </a:r>
+                      <a:endParaRPr lang="ru-RU" dirty="0"/>
+                    </a:p>
+                  </a:txBody>
+                  <a:tcPr/>
+                </a:tc>
+              </a:tr>
+              <a:tr h="370840">
+                <a:tc>
+                  <a:txBody>
+                    <a:bodyPr/>
+                    <a:lstStyle/>
+                    <a:p>
+                      <a:r>
+                        <a:rPr lang="en-US" dirty="0" smtClean="0"/>
+                        <a:t>PCA, optimal</a:t>
+                      </a:r>
+                      <a:r>
+                        <a:rPr lang="en-US" baseline="0" dirty="0" smtClean="0"/>
+                        <a:t> number T of dimensions</a:t>
+                      </a:r>
+                      <a:endParaRPr lang="ru-RU" dirty="0"/>
+                    </a:p>
+                  </a:txBody>
+                  <a:tcPr/>
+                </a:tc>
+                <a:tc>
+                  <a:txBody>
+                    <a:bodyPr/>
+                    <a:lstStyle/>
+                    <a:p>
+                      <a:r>
+                        <a:rPr lang="en-US" dirty="0" smtClean="0"/>
+                        <a:t>25</a:t>
+                      </a:r>
+                      <a:endParaRPr lang="ru-RU" dirty="0"/>
+                    </a:p>
+                  </a:txBody>
+                  <a:tcPr/>
+                </a:tc>
+              </a:tr>
+              <a:tr h="370840">
+                <a:tc>
+                  <a:txBody>
+                    <a:bodyPr/>
+                    <a:lstStyle/>
+                    <a:p>
+                      <a:r>
+                        <a:rPr lang="en-US" dirty="0" smtClean="0"/>
+                        <a:t>KNN in</a:t>
+                      </a:r>
+                      <a:r>
+                        <a:rPr lang="en-US" baseline="0" dirty="0" smtClean="0"/>
+                        <a:t> PCA-space, success rate from T and K plotting, optimal K for PCA</a:t>
+                      </a:r>
+                      <a:endParaRPr lang="ru-RU" dirty="0"/>
+                    </a:p>
+                  </a:txBody>
+                  <a:tcPr/>
+                </a:tc>
+                <a:tc>
+                  <a:txBody>
+                    <a:bodyPr/>
+                    <a:lstStyle/>
+                    <a:p>
+                      <a:r>
+                        <a:rPr lang="en-US" dirty="0" smtClean="0"/>
+                        <a:t>26</a:t>
+                      </a:r>
+                      <a:endParaRPr lang="ru-RU" dirty="0"/>
+                    </a:p>
+                  </a:txBody>
+                  <a:tcPr/>
+                </a:tc>
+              </a:tr>
+              <a:tr h="370840">
+                <a:tc>
+                  <a:txBody>
+                    <a:bodyPr/>
+                    <a:lstStyle/>
+                    <a:p>
+                      <a:r>
+                        <a:rPr lang="en-US" dirty="0" smtClean="0"/>
+                        <a:t>Analysis</a:t>
+                      </a:r>
+                      <a:r>
+                        <a:rPr lang="en-US" baseline="0" dirty="0" smtClean="0"/>
+                        <a:t> of our handwriting</a:t>
+                      </a:r>
+                      <a:endParaRPr lang="ru-RU" dirty="0"/>
+                    </a:p>
+                  </a:txBody>
+                  <a:tcPr/>
+                </a:tc>
+                <a:tc>
+                  <a:txBody>
+                    <a:bodyPr/>
+                    <a:lstStyle/>
+                    <a:p>
+                      <a:r>
+                        <a:rPr lang="en-US" dirty="0" smtClean="0"/>
+                        <a:t>27</a:t>
+                      </a:r>
+                      <a:endParaRPr lang="ru-RU" dirty="0"/>
+                    </a:p>
+                  </a:txBody>
+                  <a:tcPr/>
+                </a:tc>
+              </a:tr>
+              <a:tr h="370840">
+                <a:tc>
+                  <a:txBody>
+                    <a:bodyPr/>
+                    <a:lstStyle/>
+                    <a:p>
+                      <a:endParaRPr lang="ru-RU" dirty="0"/>
+                    </a:p>
+                  </a:txBody>
+                  <a:tcPr/>
+                </a:tc>
+                <a:tc>
+                  <a:txBody>
+                    <a:bodyPr/>
+                    <a:lstStyle/>
+                    <a:p>
+                      <a:r>
+                        <a:rPr lang="en-US" dirty="0" smtClean="0"/>
+                        <a:t>28</a:t>
+                      </a:r>
+                      <a:endParaRPr lang="ru-RU" dirty="0"/>
+                    </a:p>
+                  </a:txBody>
+                  <a:tcPr/>
+                </a:tc>
+              </a:tr>
+              <a:tr h="370840">
+                <a:tc>
+                  <a:txBody>
+                    <a:bodyPr/>
+                    <a:lstStyle/>
+                    <a:p>
+                      <a:endParaRPr lang="ru-RU" dirty="0"/>
+                    </a:p>
+                  </a:txBody>
+                  <a:tcPr/>
+                </a:tc>
+                <a:tc>
+                  <a:txBody>
+                    <a:bodyPr/>
+                    <a:lstStyle/>
+                    <a:p>
+                      <a:r>
+                        <a:rPr lang="en-US" dirty="0" smtClean="0"/>
+                        <a:t>29</a:t>
+                      </a:r>
+                      <a:endParaRPr lang="ru-RU" dirty="0"/>
+                    </a:p>
+                  </a:txBody>
+                  <a:tcPr/>
+                </a:tc>
+              </a:tr>
+              <a:tr h="370840">
+                <a:tc>
+                  <a:txBody>
+                    <a:bodyPr/>
+                    <a:lstStyle/>
+                    <a:p>
+                      <a:r>
+                        <a:rPr lang="en-US" dirty="0" smtClean="0"/>
+                        <a:t>Preparation</a:t>
+                      </a:r>
+                      <a:r>
+                        <a:rPr lang="en-US" baseline="0" dirty="0" smtClean="0"/>
+                        <a:t> to final presentation</a:t>
+                      </a:r>
+                      <a:endParaRPr lang="ru-RU" dirty="0"/>
+                    </a:p>
+                  </a:txBody>
+                  <a:tcPr/>
+                </a:tc>
+                <a:tc>
+                  <a:txBody>
+                    <a:bodyPr/>
+                    <a:lstStyle/>
+                    <a:p>
+                      <a:r>
+                        <a:rPr lang="en-US" dirty="0" smtClean="0"/>
+                        <a:t>30</a:t>
+                      </a:r>
+                      <a:endParaRPr lang="ru-RU" dirty="0"/>
+                    </a:p>
+                  </a:txBody>
+                  <a:tcPr/>
+                </a:tc>
+              </a:tr>
+            </a:tbl>
+          </a:graphicData>
+        </a:graphic>
+      </p:graphicFrame>
+    </p:spTree>
+    <p:extLst>
+      <p:ext uri="{BB962C8B-B14F-4D97-AF65-F5344CB8AC3E}">
+        <p14:creationId xmlns:p14="http://schemas.microsoft.com/office/powerpoint/2010/main" val="3339586047"/>
+      </p:ext>
+    </p:extLst>
+  </p:cSld>
+  <p:clrMapOvr>
+    <a:masterClrMapping/>
+  </p:clrMapOvr>
+  <p:timing>
+    <p:tnLst>
+      <p:par>
+        <p:cTn id="1" dur="indefinite" restart="never" nodeType="tmRoot"/>
+      </p:par>
+    </p:tnLst>
+  </p:timing>
 </p:sld>
 </file>
 
@@ -16113,7 +16648,7 @@
   <a:extraClrSchemeLst/>
   <a:extLst>
     <a:ext uri="{05A4C25C-085E-4340-85A3-A5531E510DB2}">
-      <thm15:themeFamily xmlns:thm15="http://schemas.microsoft.com/office/thememl/2012/main" name="Retrospect" id="{5F128B03-DCCA-4EEB-AB3B-CF2899314A46}" vid="{9CC26709-368C-4D72-9060-94E5B3FF3CD6}"/>
+      <thm15:themeFamily xmlns:thm15="http://schemas.microsoft.com/office/thememl/2012/main" xmlns="" name="Retrospect" id="{5F128B03-DCCA-4EEB-AB3B-CF2899314A46}" vid="{9CC26709-368C-4D72-9060-94E5B3FF3CD6}"/>
     </a:ext>
   </a:extLst>
 </a:theme>

</xml_diff>